<commit_message>
report - code part
</commit_message>
<xml_diff>
--- a/Experiment_Report/drafts.pptx
+++ b/Experiment_Report/drafts.pptx
@@ -14,6 +14,8 @@
     <p:sldId id="262" r:id="rId8"/>
     <p:sldId id="263" r:id="rId9"/>
     <p:sldId id="264" r:id="rId10"/>
+    <p:sldId id="265" r:id="rId11"/>
+    <p:sldId id="266" r:id="rId12"/>
   </p:sldIdLst>
   <p:sldSz cx="6858000" cy="12192000"/>
   <p:notesSz cx="6858000" cy="9144000"/>
@@ -3396,6 +3398,3000 @@
 </p:sld>
 </file>
 
+<file path=ppt/slides/slide10.xml><?xml version="1.0" encoding="utf-8"?>
+<p:sld xmlns:a="http://schemas.openxmlformats.org/drawingml/2006/main" xmlns:r="http://schemas.openxmlformats.org/officeDocument/2006/relationships" xmlns:p="http://schemas.openxmlformats.org/presentationml/2006/main">
+  <p:cSld>
+    <p:spTree>
+      <p:nvGrpSpPr>
+        <p:cNvPr id="1" name=""/>
+        <p:cNvGrpSpPr/>
+        <p:nvPr/>
+      </p:nvGrpSpPr>
+      <p:grpSpPr>
+        <a:xfrm>
+          <a:off x="0" y="0"/>
+          <a:ext cx="0" cy="0"/>
+          <a:chOff x="0" y="0"/>
+          <a:chExt cx="0" cy="0"/>
+        </a:xfrm>
+      </p:grpSpPr>
+      <p:sp>
+        <p:nvSpPr>
+          <p:cNvPr id="4" name="圆角矩形 3"/>
+          <p:cNvSpPr/>
+          <p:nvPr/>
+        </p:nvSpPr>
+        <p:spPr>
+          <a:xfrm>
+            <a:off x="1337733" y="514079"/>
+            <a:ext cx="2438400" cy="254000"/>
+          </a:xfrm>
+          <a:prstGeom prst="roundRect">
+            <a:avLst/>
+          </a:prstGeom>
+        </p:spPr>
+        <p:style>
+          <a:lnRef idx="2">
+            <a:schemeClr val="dk1"/>
+          </a:lnRef>
+          <a:fillRef idx="1">
+            <a:schemeClr val="lt1"/>
+          </a:fillRef>
+          <a:effectRef idx="0">
+            <a:schemeClr val="dk1"/>
+          </a:effectRef>
+          <a:fontRef idx="minor">
+            <a:schemeClr val="dk1"/>
+          </a:fontRef>
+        </p:style>
+        <p:txBody>
+          <a:bodyPr rtlCol="0" anchor="ctr"/>
+          <a:lstStyle/>
+          <a:p>
+            <a:pPr algn="ctr"/>
+            <a:r>
+              <a:rPr lang="zh-CN" altLang="en-US" sz="1200" dirty="0" smtClean="0">
+                <a:latin typeface="宋体" panose="02010600030101010101" pitchFamily="2" charset="-122"/>
+                <a:ea typeface="宋体" panose="02010600030101010101" pitchFamily="2" charset="-122"/>
+              </a:rPr>
+              <a:t>进入</a:t>
+            </a:r>
+            <a:r>
+              <a:rPr lang="en-US" altLang="zh-CN" sz="1200" dirty="0" err="1" smtClean="0">
+                <a:latin typeface="宋体" panose="02010600030101010101" pitchFamily="2" charset="-122"/>
+                <a:ea typeface="宋体" panose="02010600030101010101" pitchFamily="2" charset="-122"/>
+              </a:rPr>
+              <a:t>getTeamByTeacherNum</a:t>
+            </a:r>
+            <a:r>
+              <a:rPr lang="en-US" altLang="zh-CN" sz="1200" dirty="0" smtClean="0">
+                <a:latin typeface="宋体" panose="02010600030101010101" pitchFamily="2" charset="-122"/>
+                <a:ea typeface="宋体" panose="02010600030101010101" pitchFamily="2" charset="-122"/>
+              </a:rPr>
+              <a:t>()</a:t>
+            </a:r>
+            <a:r>
+              <a:rPr lang="zh-CN" altLang="en-US" sz="1200" dirty="0" smtClean="0">
+                <a:latin typeface="宋体" panose="02010600030101010101" pitchFamily="2" charset="-122"/>
+                <a:ea typeface="宋体" panose="02010600030101010101" pitchFamily="2" charset="-122"/>
+              </a:rPr>
+              <a:t>函数</a:t>
+            </a:r>
+            <a:endParaRPr lang="zh-CN" altLang="en-US" sz="1200" dirty="0">
+              <a:latin typeface="宋体" panose="02010600030101010101" pitchFamily="2" charset="-122"/>
+              <a:ea typeface="宋体" panose="02010600030101010101" pitchFamily="2" charset="-122"/>
+            </a:endParaRPr>
+          </a:p>
+        </p:txBody>
+      </p:sp>
+      <p:sp>
+        <p:nvSpPr>
+          <p:cNvPr id="5" name="圆角矩形 4"/>
+          <p:cNvSpPr/>
+          <p:nvPr/>
+        </p:nvSpPr>
+        <p:spPr>
+          <a:xfrm>
+            <a:off x="1756833" y="1005145"/>
+            <a:ext cx="1600200" cy="254000"/>
+          </a:xfrm>
+          <a:prstGeom prst="roundRect">
+            <a:avLst/>
+          </a:prstGeom>
+        </p:spPr>
+        <p:style>
+          <a:lnRef idx="2">
+            <a:schemeClr val="dk1"/>
+          </a:lnRef>
+          <a:fillRef idx="1">
+            <a:schemeClr val="lt1"/>
+          </a:fillRef>
+          <a:effectRef idx="0">
+            <a:schemeClr val="dk1"/>
+          </a:effectRef>
+          <a:fontRef idx="minor">
+            <a:schemeClr val="dk1"/>
+          </a:fontRef>
+        </p:style>
+        <p:txBody>
+          <a:bodyPr rtlCol="0" anchor="ctr"/>
+          <a:lstStyle/>
+          <a:p>
+            <a:pPr algn="ctr"/>
+            <a:r>
+              <a:rPr lang="zh-CN" altLang="en-US" sz="1200" dirty="0" smtClean="0">
+                <a:latin typeface="宋体" panose="02010600030101010101" pitchFamily="2" charset="-122"/>
+                <a:ea typeface="宋体" panose="02010600030101010101" pitchFamily="2" charset="-122"/>
+              </a:rPr>
+              <a:t>创建搜索结果挂载点</a:t>
+            </a:r>
+            <a:endParaRPr lang="zh-CN" altLang="en-US" sz="1200" dirty="0">
+              <a:latin typeface="宋体" panose="02010600030101010101" pitchFamily="2" charset="-122"/>
+              <a:ea typeface="宋体" panose="02010600030101010101" pitchFamily="2" charset="-122"/>
+            </a:endParaRPr>
+          </a:p>
+        </p:txBody>
+      </p:sp>
+      <p:cxnSp>
+        <p:nvCxnSpPr>
+          <p:cNvPr id="7" name="直接箭头连接符 6"/>
+          <p:cNvCxnSpPr>
+            <a:stCxn id="4" idx="2"/>
+            <a:endCxn id="5" idx="0"/>
+          </p:cNvCxnSpPr>
+          <p:nvPr/>
+        </p:nvCxnSpPr>
+        <p:spPr>
+          <a:xfrm>
+            <a:off x="2556933" y="768079"/>
+            <a:ext cx="0" cy="237066"/>
+          </a:xfrm>
+          <a:prstGeom prst="straightConnector1">
+            <a:avLst/>
+          </a:prstGeom>
+          <a:ln w="12700">
+            <a:tailEnd type="triangle"/>
+          </a:ln>
+        </p:spPr>
+        <p:style>
+          <a:lnRef idx="1">
+            <a:schemeClr val="dk1"/>
+          </a:lnRef>
+          <a:fillRef idx="0">
+            <a:schemeClr val="dk1"/>
+          </a:fillRef>
+          <a:effectRef idx="0">
+            <a:schemeClr val="dk1"/>
+          </a:effectRef>
+          <a:fontRef idx="minor">
+            <a:schemeClr val="tx1"/>
+          </a:fontRef>
+        </p:style>
+      </p:cxnSp>
+      <p:sp>
+        <p:nvSpPr>
+          <p:cNvPr id="10" name="流程图: 决策 9"/>
+          <p:cNvSpPr/>
+          <p:nvPr/>
+        </p:nvSpPr>
+        <p:spPr>
+          <a:xfrm>
+            <a:off x="1751545" y="1496211"/>
+            <a:ext cx="1605488" cy="827132"/>
+          </a:xfrm>
+          <a:prstGeom prst="flowChartDecision">
+            <a:avLst/>
+          </a:prstGeom>
+        </p:spPr>
+        <p:style>
+          <a:lnRef idx="2">
+            <a:schemeClr val="dk1"/>
+          </a:lnRef>
+          <a:fillRef idx="1">
+            <a:schemeClr val="lt1"/>
+          </a:fillRef>
+          <a:effectRef idx="0">
+            <a:schemeClr val="dk1"/>
+          </a:effectRef>
+          <a:fontRef idx="minor">
+            <a:schemeClr val="dk1"/>
+          </a:fontRef>
+        </p:style>
+        <p:txBody>
+          <a:bodyPr rtlCol="0" anchor="ctr"/>
+          <a:lstStyle/>
+          <a:p>
+            <a:pPr lvl="0" algn="ctr"/>
+            <a:r>
+              <a:rPr lang="zh-CN" altLang="en-US" sz="1200" dirty="0" smtClean="0">
+                <a:solidFill>
+                  <a:prstClr val="black"/>
+                </a:solidFill>
+                <a:latin typeface="宋体" panose="02010600030101010101" pitchFamily="2" charset="-122"/>
+                <a:ea typeface="宋体" panose="02010600030101010101" pitchFamily="2" charset="-122"/>
+              </a:rPr>
+              <a:t>检查传入链表是否有数据？</a:t>
+            </a:r>
+            <a:endParaRPr lang="zh-CN" altLang="en-US" sz="1200" dirty="0">
+              <a:solidFill>
+                <a:prstClr val="black"/>
+              </a:solidFill>
+              <a:latin typeface="宋体" panose="02010600030101010101" pitchFamily="2" charset="-122"/>
+              <a:ea typeface="宋体" panose="02010600030101010101" pitchFamily="2" charset="-122"/>
+            </a:endParaRPr>
+          </a:p>
+        </p:txBody>
+      </p:sp>
+      <p:cxnSp>
+        <p:nvCxnSpPr>
+          <p:cNvPr id="11" name="直接箭头连接符 10"/>
+          <p:cNvCxnSpPr>
+            <a:stCxn id="5" idx="2"/>
+            <a:endCxn id="10" idx="0"/>
+          </p:cNvCxnSpPr>
+          <p:nvPr/>
+        </p:nvCxnSpPr>
+        <p:spPr>
+          <a:xfrm flipH="1">
+            <a:off x="2554289" y="1259145"/>
+            <a:ext cx="2644" cy="237066"/>
+          </a:xfrm>
+          <a:prstGeom prst="straightConnector1">
+            <a:avLst/>
+          </a:prstGeom>
+          <a:ln w="12700">
+            <a:tailEnd type="triangle"/>
+          </a:ln>
+        </p:spPr>
+        <p:style>
+          <a:lnRef idx="1">
+            <a:schemeClr val="dk1"/>
+          </a:lnRef>
+          <a:fillRef idx="0">
+            <a:schemeClr val="dk1"/>
+          </a:fillRef>
+          <a:effectRef idx="0">
+            <a:schemeClr val="dk1"/>
+          </a:effectRef>
+          <a:fontRef idx="minor">
+            <a:schemeClr val="tx1"/>
+          </a:fontRef>
+        </p:style>
+      </p:cxnSp>
+      <p:sp>
+        <p:nvSpPr>
+          <p:cNvPr id="16" name="圆角矩形 15"/>
+          <p:cNvSpPr/>
+          <p:nvPr/>
+        </p:nvSpPr>
+        <p:spPr>
+          <a:xfrm>
+            <a:off x="1707095" y="2560409"/>
+            <a:ext cx="1694388" cy="254000"/>
+          </a:xfrm>
+          <a:prstGeom prst="roundRect">
+            <a:avLst/>
+          </a:prstGeom>
+        </p:spPr>
+        <p:style>
+          <a:lnRef idx="2">
+            <a:schemeClr val="dk1"/>
+          </a:lnRef>
+          <a:fillRef idx="1">
+            <a:schemeClr val="lt1"/>
+          </a:fillRef>
+          <a:effectRef idx="0">
+            <a:schemeClr val="dk1"/>
+          </a:effectRef>
+          <a:fontRef idx="minor">
+            <a:schemeClr val="dk1"/>
+          </a:fontRef>
+        </p:style>
+        <p:txBody>
+          <a:bodyPr rtlCol="0" anchor="ctr"/>
+          <a:lstStyle/>
+          <a:p>
+            <a:pPr algn="ctr"/>
+            <a:r>
+              <a:rPr lang="zh-CN" altLang="en-US" sz="1200" dirty="0" smtClean="0">
+                <a:latin typeface="宋体" panose="02010600030101010101" pitchFamily="2" charset="-122"/>
+                <a:ea typeface="宋体" panose="02010600030101010101" pitchFamily="2" charset="-122"/>
+              </a:rPr>
+              <a:t>设定判断函数</a:t>
+            </a:r>
+            <a:r>
+              <a:rPr lang="en-US" altLang="zh-CN" sz="1200" dirty="0" smtClean="0">
+                <a:latin typeface="宋体" panose="02010600030101010101" pitchFamily="2" charset="-122"/>
+                <a:ea typeface="宋体" panose="02010600030101010101" pitchFamily="2" charset="-122"/>
+              </a:rPr>
+              <a:t>judger()</a:t>
+            </a:r>
+            <a:endParaRPr lang="zh-CN" altLang="en-US" sz="1200" dirty="0">
+              <a:latin typeface="宋体" panose="02010600030101010101" pitchFamily="2" charset="-122"/>
+              <a:ea typeface="宋体" panose="02010600030101010101" pitchFamily="2" charset="-122"/>
+            </a:endParaRPr>
+          </a:p>
+        </p:txBody>
+      </p:sp>
+      <p:sp>
+        <p:nvSpPr>
+          <p:cNvPr id="17" name="流程图: 决策 16"/>
+          <p:cNvSpPr/>
+          <p:nvPr/>
+        </p:nvSpPr>
+        <p:spPr>
+          <a:xfrm>
+            <a:off x="1990728" y="3542541"/>
+            <a:ext cx="1127121" cy="555343"/>
+          </a:xfrm>
+          <a:prstGeom prst="flowChartDecision">
+            <a:avLst/>
+          </a:prstGeom>
+        </p:spPr>
+        <p:style>
+          <a:lnRef idx="2">
+            <a:schemeClr val="dk1"/>
+          </a:lnRef>
+          <a:fillRef idx="1">
+            <a:schemeClr val="lt1"/>
+          </a:fillRef>
+          <a:effectRef idx="0">
+            <a:schemeClr val="dk1"/>
+          </a:effectRef>
+          <a:fontRef idx="minor">
+            <a:schemeClr val="dk1"/>
+          </a:fontRef>
+        </p:style>
+        <p:txBody>
+          <a:bodyPr rtlCol="0" anchor="ctr"/>
+          <a:lstStyle/>
+          <a:p>
+            <a:pPr lvl="0" algn="ctr"/>
+            <a:r>
+              <a:rPr lang="zh-CN" altLang="en-US" sz="1200" dirty="0" smtClean="0">
+                <a:solidFill>
+                  <a:prstClr val="black"/>
+                </a:solidFill>
+                <a:latin typeface="宋体" panose="02010600030101010101" pitchFamily="2" charset="-122"/>
+                <a:ea typeface="宋体" panose="02010600030101010101" pitchFamily="2" charset="-122"/>
+              </a:rPr>
+              <a:t>遍历完毕？</a:t>
+            </a:r>
+            <a:endParaRPr lang="zh-CN" altLang="en-US" sz="1200" dirty="0">
+              <a:solidFill>
+                <a:prstClr val="black"/>
+              </a:solidFill>
+              <a:latin typeface="宋体" panose="02010600030101010101" pitchFamily="2" charset="-122"/>
+              <a:ea typeface="宋体" panose="02010600030101010101" pitchFamily="2" charset="-122"/>
+            </a:endParaRPr>
+          </a:p>
+        </p:txBody>
+      </p:sp>
+      <p:sp>
+        <p:nvSpPr>
+          <p:cNvPr id="18" name="圆角矩形 17"/>
+          <p:cNvSpPr/>
+          <p:nvPr/>
+        </p:nvSpPr>
+        <p:spPr>
+          <a:xfrm>
+            <a:off x="1837270" y="3051475"/>
+            <a:ext cx="1434038" cy="254000"/>
+          </a:xfrm>
+          <a:prstGeom prst="roundRect">
+            <a:avLst/>
+          </a:prstGeom>
+        </p:spPr>
+        <p:style>
+          <a:lnRef idx="2">
+            <a:schemeClr val="dk1"/>
+          </a:lnRef>
+          <a:fillRef idx="1">
+            <a:schemeClr val="lt1"/>
+          </a:fillRef>
+          <a:effectRef idx="0">
+            <a:schemeClr val="dk1"/>
+          </a:effectRef>
+          <a:fontRef idx="minor">
+            <a:schemeClr val="dk1"/>
+          </a:fontRef>
+        </p:style>
+        <p:txBody>
+          <a:bodyPr rtlCol="0" anchor="ctr"/>
+          <a:lstStyle/>
+          <a:p>
+            <a:pPr algn="ctr"/>
+            <a:r>
+              <a:rPr lang="zh-CN" altLang="en-US" sz="1200" dirty="0" smtClean="0">
+                <a:latin typeface="宋体" panose="02010600030101010101" pitchFamily="2" charset="-122"/>
+                <a:ea typeface="宋体" panose="02010600030101010101" pitchFamily="2" charset="-122"/>
+              </a:rPr>
+              <a:t>开始遍历团队链表</a:t>
+            </a:r>
+            <a:endParaRPr lang="zh-CN" altLang="en-US" sz="1200" dirty="0">
+              <a:latin typeface="宋体" panose="02010600030101010101" pitchFamily="2" charset="-122"/>
+              <a:ea typeface="宋体" panose="02010600030101010101" pitchFamily="2" charset="-122"/>
+            </a:endParaRPr>
+          </a:p>
+        </p:txBody>
+      </p:sp>
+      <p:cxnSp>
+        <p:nvCxnSpPr>
+          <p:cNvPr id="19" name="直接箭头连接符 18"/>
+          <p:cNvCxnSpPr>
+            <a:stCxn id="10" idx="2"/>
+            <a:endCxn id="16" idx="0"/>
+          </p:cNvCxnSpPr>
+          <p:nvPr/>
+        </p:nvCxnSpPr>
+        <p:spPr>
+          <a:xfrm>
+            <a:off x="2554289" y="2323343"/>
+            <a:ext cx="0" cy="237066"/>
+          </a:xfrm>
+          <a:prstGeom prst="straightConnector1">
+            <a:avLst/>
+          </a:prstGeom>
+          <a:ln w="12700">
+            <a:tailEnd type="triangle"/>
+          </a:ln>
+        </p:spPr>
+        <p:style>
+          <a:lnRef idx="1">
+            <a:schemeClr val="dk1"/>
+          </a:lnRef>
+          <a:fillRef idx="0">
+            <a:schemeClr val="dk1"/>
+          </a:fillRef>
+          <a:effectRef idx="0">
+            <a:schemeClr val="dk1"/>
+          </a:effectRef>
+          <a:fontRef idx="minor">
+            <a:schemeClr val="tx1"/>
+          </a:fontRef>
+        </p:style>
+      </p:cxnSp>
+      <p:cxnSp>
+        <p:nvCxnSpPr>
+          <p:cNvPr id="22" name="直接箭头连接符 21"/>
+          <p:cNvCxnSpPr>
+            <a:stCxn id="16" idx="2"/>
+            <a:endCxn id="18" idx="0"/>
+          </p:cNvCxnSpPr>
+          <p:nvPr/>
+        </p:nvCxnSpPr>
+        <p:spPr>
+          <a:xfrm>
+            <a:off x="2554289" y="2814409"/>
+            <a:ext cx="0" cy="237066"/>
+          </a:xfrm>
+          <a:prstGeom prst="straightConnector1">
+            <a:avLst/>
+          </a:prstGeom>
+          <a:ln w="12700">
+            <a:tailEnd type="triangle"/>
+          </a:ln>
+        </p:spPr>
+        <p:style>
+          <a:lnRef idx="1">
+            <a:schemeClr val="dk1"/>
+          </a:lnRef>
+          <a:fillRef idx="0">
+            <a:schemeClr val="dk1"/>
+          </a:fillRef>
+          <a:effectRef idx="0">
+            <a:schemeClr val="dk1"/>
+          </a:effectRef>
+          <a:fontRef idx="minor">
+            <a:schemeClr val="tx1"/>
+          </a:fontRef>
+        </p:style>
+      </p:cxnSp>
+      <p:cxnSp>
+        <p:nvCxnSpPr>
+          <p:cNvPr id="25" name="直接箭头连接符 24"/>
+          <p:cNvCxnSpPr>
+            <a:stCxn id="18" idx="2"/>
+            <a:endCxn id="17" idx="0"/>
+          </p:cNvCxnSpPr>
+          <p:nvPr/>
+        </p:nvCxnSpPr>
+        <p:spPr>
+          <a:xfrm>
+            <a:off x="2554289" y="3305475"/>
+            <a:ext cx="0" cy="237066"/>
+          </a:xfrm>
+          <a:prstGeom prst="straightConnector1">
+            <a:avLst/>
+          </a:prstGeom>
+          <a:ln w="12700">
+            <a:tailEnd type="triangle"/>
+          </a:ln>
+        </p:spPr>
+        <p:style>
+          <a:lnRef idx="1">
+            <a:schemeClr val="dk1"/>
+          </a:lnRef>
+          <a:fillRef idx="0">
+            <a:schemeClr val="dk1"/>
+          </a:fillRef>
+          <a:effectRef idx="0">
+            <a:schemeClr val="dk1"/>
+          </a:effectRef>
+          <a:fontRef idx="minor">
+            <a:schemeClr val="tx1"/>
+          </a:fontRef>
+        </p:style>
+      </p:cxnSp>
+      <p:sp>
+        <p:nvSpPr>
+          <p:cNvPr id="29" name="流程图: 决策 28"/>
+          <p:cNvSpPr/>
+          <p:nvPr/>
+        </p:nvSpPr>
+        <p:spPr>
+          <a:xfrm>
+            <a:off x="1725086" y="4339281"/>
+            <a:ext cx="1658406" cy="689937"/>
+          </a:xfrm>
+          <a:prstGeom prst="flowChartDecision">
+            <a:avLst/>
+          </a:prstGeom>
+        </p:spPr>
+        <p:style>
+          <a:lnRef idx="2">
+            <a:schemeClr val="dk1"/>
+          </a:lnRef>
+          <a:fillRef idx="1">
+            <a:schemeClr val="lt1"/>
+          </a:fillRef>
+          <a:effectRef idx="0">
+            <a:schemeClr val="dk1"/>
+          </a:effectRef>
+          <a:fontRef idx="minor">
+            <a:schemeClr val="dk1"/>
+          </a:fontRef>
+        </p:style>
+        <p:txBody>
+          <a:bodyPr rtlCol="0" anchor="ctr"/>
+          <a:lstStyle/>
+          <a:p>
+            <a:pPr lvl="0" algn="ctr"/>
+            <a:r>
+              <a:rPr lang="zh-CN" altLang="en-US" sz="1200" dirty="0" smtClean="0">
+                <a:solidFill>
+                  <a:prstClr val="black"/>
+                </a:solidFill>
+                <a:latin typeface="宋体" panose="02010600030101010101" pitchFamily="2" charset="-122"/>
+                <a:ea typeface="宋体" panose="02010600030101010101" pitchFamily="2" charset="-122"/>
+              </a:rPr>
+              <a:t>当前团队满足搜索条件？</a:t>
+            </a:r>
+            <a:endParaRPr lang="zh-CN" altLang="en-US" sz="1200" dirty="0">
+              <a:solidFill>
+                <a:prstClr val="black"/>
+              </a:solidFill>
+              <a:latin typeface="宋体" panose="02010600030101010101" pitchFamily="2" charset="-122"/>
+              <a:ea typeface="宋体" panose="02010600030101010101" pitchFamily="2" charset="-122"/>
+            </a:endParaRPr>
+          </a:p>
+        </p:txBody>
+      </p:sp>
+      <p:cxnSp>
+        <p:nvCxnSpPr>
+          <p:cNvPr id="30" name="直接箭头连接符 29"/>
+          <p:cNvCxnSpPr>
+            <a:stCxn id="17" idx="2"/>
+            <a:endCxn id="29" idx="0"/>
+          </p:cNvCxnSpPr>
+          <p:nvPr/>
+        </p:nvCxnSpPr>
+        <p:spPr>
+          <a:xfrm>
+            <a:off x="2554289" y="4097884"/>
+            <a:ext cx="0" cy="241397"/>
+          </a:xfrm>
+          <a:prstGeom prst="straightConnector1">
+            <a:avLst/>
+          </a:prstGeom>
+          <a:ln w="12700">
+            <a:tailEnd type="triangle"/>
+          </a:ln>
+        </p:spPr>
+        <p:style>
+          <a:lnRef idx="1">
+            <a:schemeClr val="dk1"/>
+          </a:lnRef>
+          <a:fillRef idx="0">
+            <a:schemeClr val="dk1"/>
+          </a:fillRef>
+          <a:effectRef idx="0">
+            <a:schemeClr val="dk1"/>
+          </a:effectRef>
+          <a:fontRef idx="minor">
+            <a:schemeClr val="tx1"/>
+          </a:fontRef>
+        </p:style>
+      </p:cxnSp>
+      <p:cxnSp>
+        <p:nvCxnSpPr>
+          <p:cNvPr id="33" name="肘形连接符 32"/>
+          <p:cNvCxnSpPr>
+            <a:stCxn id="29" idx="1"/>
+            <a:endCxn id="17" idx="1"/>
+          </p:cNvCxnSpPr>
+          <p:nvPr/>
+        </p:nvCxnSpPr>
+        <p:spPr>
+          <a:xfrm rot="10800000" flipH="1">
+            <a:off x="1725086" y="3820214"/>
+            <a:ext cx="265642" cy="864037"/>
+          </a:xfrm>
+          <a:prstGeom prst="bentConnector3">
+            <a:avLst>
+              <a:gd name="adj1" fmla="val -105180"/>
+            </a:avLst>
+          </a:prstGeom>
+          <a:ln w="12700">
+            <a:tailEnd type="triangle"/>
+          </a:ln>
+        </p:spPr>
+        <p:style>
+          <a:lnRef idx="1">
+            <a:schemeClr val="dk1"/>
+          </a:lnRef>
+          <a:fillRef idx="0">
+            <a:schemeClr val="dk1"/>
+          </a:fillRef>
+          <a:effectRef idx="0">
+            <a:schemeClr val="dk1"/>
+          </a:effectRef>
+          <a:fontRef idx="minor">
+            <a:schemeClr val="tx1"/>
+          </a:fontRef>
+        </p:style>
+      </p:cxnSp>
+      <p:sp>
+        <p:nvSpPr>
+          <p:cNvPr id="37" name="文本框 36"/>
+          <p:cNvSpPr txBox="1"/>
+          <p:nvPr/>
+        </p:nvSpPr>
+        <p:spPr>
+          <a:xfrm>
+            <a:off x="2483047" y="4968214"/>
+            <a:ext cx="408125" cy="276999"/>
+          </a:xfrm>
+          <a:prstGeom prst="rect">
+            <a:avLst/>
+          </a:prstGeom>
+          <a:noFill/>
+        </p:spPr>
+        <p:txBody>
+          <a:bodyPr wrap="none" rtlCol="0">
+            <a:spAutoFit/>
+          </a:bodyPr>
+          <a:lstStyle/>
+          <a:p>
+            <a:r>
+              <a:rPr lang="en-US" altLang="zh-CN" sz="1200" dirty="0" smtClean="0">
+                <a:latin typeface="Times New Roman" panose="02020603050405020304" pitchFamily="18" charset="0"/>
+                <a:ea typeface="宋体" panose="02010600030101010101" pitchFamily="2" charset="-122"/>
+                <a:cs typeface="Times New Roman" panose="02020603050405020304" pitchFamily="18" charset="0"/>
+              </a:rPr>
+              <a:t>Yes</a:t>
+            </a:r>
+            <a:endParaRPr lang="zh-CN" altLang="en-US" sz="1200" dirty="0">
+              <a:latin typeface="Times New Roman" panose="02020603050405020304" pitchFamily="18" charset="0"/>
+              <a:ea typeface="宋体" panose="02010600030101010101" pitchFamily="2" charset="-122"/>
+              <a:cs typeface="Times New Roman" panose="02020603050405020304" pitchFamily="18" charset="0"/>
+            </a:endParaRPr>
+          </a:p>
+        </p:txBody>
+      </p:sp>
+      <p:sp>
+        <p:nvSpPr>
+          <p:cNvPr id="38" name="文本框 37"/>
+          <p:cNvSpPr txBox="1"/>
+          <p:nvPr/>
+        </p:nvSpPr>
+        <p:spPr>
+          <a:xfrm>
+            <a:off x="1475397" y="4457814"/>
+            <a:ext cx="372218" cy="276999"/>
+          </a:xfrm>
+          <a:prstGeom prst="rect">
+            <a:avLst/>
+          </a:prstGeom>
+          <a:noFill/>
+        </p:spPr>
+        <p:txBody>
+          <a:bodyPr wrap="none" rtlCol="0">
+            <a:spAutoFit/>
+          </a:bodyPr>
+          <a:lstStyle/>
+          <a:p>
+            <a:r>
+              <a:rPr lang="en-US" altLang="zh-CN" sz="1200" dirty="0" smtClean="0">
+                <a:latin typeface="Times New Roman" panose="02020603050405020304" pitchFamily="18" charset="0"/>
+                <a:ea typeface="宋体" panose="02010600030101010101" pitchFamily="2" charset="-122"/>
+                <a:cs typeface="Times New Roman" panose="02020603050405020304" pitchFamily="18" charset="0"/>
+              </a:rPr>
+              <a:t>No</a:t>
+            </a:r>
+            <a:endParaRPr lang="zh-CN" altLang="en-US" sz="1200" dirty="0">
+              <a:latin typeface="Times New Roman" panose="02020603050405020304" pitchFamily="18" charset="0"/>
+              <a:ea typeface="宋体" panose="02010600030101010101" pitchFamily="2" charset="-122"/>
+              <a:cs typeface="Times New Roman" panose="02020603050405020304" pitchFamily="18" charset="0"/>
+            </a:endParaRPr>
+          </a:p>
+        </p:txBody>
+      </p:sp>
+      <p:sp>
+        <p:nvSpPr>
+          <p:cNvPr id="39" name="文本框 38"/>
+          <p:cNvSpPr txBox="1"/>
+          <p:nvPr/>
+        </p:nvSpPr>
+        <p:spPr>
+          <a:xfrm>
+            <a:off x="2501001" y="4027354"/>
+            <a:ext cx="372218" cy="276999"/>
+          </a:xfrm>
+          <a:prstGeom prst="rect">
+            <a:avLst/>
+          </a:prstGeom>
+          <a:noFill/>
+        </p:spPr>
+        <p:txBody>
+          <a:bodyPr wrap="none" rtlCol="0">
+            <a:spAutoFit/>
+          </a:bodyPr>
+          <a:lstStyle/>
+          <a:p>
+            <a:r>
+              <a:rPr lang="en-US" altLang="zh-CN" sz="1200" dirty="0" smtClean="0">
+                <a:latin typeface="Times New Roman" panose="02020603050405020304" pitchFamily="18" charset="0"/>
+                <a:ea typeface="宋体" panose="02010600030101010101" pitchFamily="2" charset="-122"/>
+                <a:cs typeface="Times New Roman" panose="02020603050405020304" pitchFamily="18" charset="0"/>
+              </a:rPr>
+              <a:t>No</a:t>
+            </a:r>
+            <a:endParaRPr lang="zh-CN" altLang="en-US" sz="1200" dirty="0">
+              <a:latin typeface="Times New Roman" panose="02020603050405020304" pitchFamily="18" charset="0"/>
+              <a:ea typeface="宋体" panose="02010600030101010101" pitchFamily="2" charset="-122"/>
+              <a:cs typeface="Times New Roman" panose="02020603050405020304" pitchFamily="18" charset="0"/>
+            </a:endParaRPr>
+          </a:p>
+        </p:txBody>
+      </p:sp>
+      <p:sp>
+        <p:nvSpPr>
+          <p:cNvPr id="40" name="圆角矩形 39"/>
+          <p:cNvSpPr/>
+          <p:nvPr/>
+        </p:nvSpPr>
+        <p:spPr>
+          <a:xfrm>
+            <a:off x="1983053" y="5270615"/>
+            <a:ext cx="1142469" cy="425741"/>
+          </a:xfrm>
+          <a:prstGeom prst="roundRect">
+            <a:avLst/>
+          </a:prstGeom>
+        </p:spPr>
+        <p:style>
+          <a:lnRef idx="2">
+            <a:schemeClr val="dk1"/>
+          </a:lnRef>
+          <a:fillRef idx="1">
+            <a:schemeClr val="lt1"/>
+          </a:fillRef>
+          <a:effectRef idx="0">
+            <a:schemeClr val="dk1"/>
+          </a:effectRef>
+          <a:fontRef idx="minor">
+            <a:schemeClr val="dk1"/>
+          </a:fontRef>
+        </p:style>
+        <p:txBody>
+          <a:bodyPr rtlCol="0" anchor="ctr"/>
+          <a:lstStyle/>
+          <a:p>
+            <a:pPr algn="ctr"/>
+            <a:r>
+              <a:rPr lang="zh-CN" altLang="en-US" sz="1200" dirty="0" smtClean="0">
+                <a:latin typeface="宋体" panose="02010600030101010101" pitchFamily="2" charset="-122"/>
+                <a:ea typeface="宋体" panose="02010600030101010101" pitchFamily="2" charset="-122"/>
+              </a:rPr>
+              <a:t>向搜索结果链添加结果项</a:t>
+            </a:r>
+            <a:endParaRPr lang="zh-CN" altLang="en-US" sz="1200" dirty="0">
+              <a:latin typeface="宋体" panose="02010600030101010101" pitchFamily="2" charset="-122"/>
+              <a:ea typeface="宋体" panose="02010600030101010101" pitchFamily="2" charset="-122"/>
+            </a:endParaRPr>
+          </a:p>
+        </p:txBody>
+      </p:sp>
+      <p:cxnSp>
+        <p:nvCxnSpPr>
+          <p:cNvPr id="41" name="直接箭头连接符 40"/>
+          <p:cNvCxnSpPr>
+            <a:stCxn id="29" idx="2"/>
+            <a:endCxn id="40" idx="0"/>
+          </p:cNvCxnSpPr>
+          <p:nvPr/>
+        </p:nvCxnSpPr>
+        <p:spPr>
+          <a:xfrm flipH="1">
+            <a:off x="2554288" y="5029218"/>
+            <a:ext cx="1" cy="241397"/>
+          </a:xfrm>
+          <a:prstGeom prst="straightConnector1">
+            <a:avLst/>
+          </a:prstGeom>
+          <a:ln w="12700">
+            <a:tailEnd type="triangle"/>
+          </a:ln>
+        </p:spPr>
+        <p:style>
+          <a:lnRef idx="1">
+            <a:schemeClr val="dk1"/>
+          </a:lnRef>
+          <a:fillRef idx="0">
+            <a:schemeClr val="dk1"/>
+          </a:fillRef>
+          <a:effectRef idx="0">
+            <a:schemeClr val="dk1"/>
+          </a:effectRef>
+          <a:fontRef idx="minor">
+            <a:schemeClr val="tx1"/>
+          </a:fontRef>
+        </p:style>
+      </p:cxnSp>
+      <p:sp>
+        <p:nvSpPr>
+          <p:cNvPr id="47" name="圆角矩形 46"/>
+          <p:cNvSpPr/>
+          <p:nvPr/>
+        </p:nvSpPr>
+        <p:spPr>
+          <a:xfrm>
+            <a:off x="1983053" y="6140955"/>
+            <a:ext cx="1142469" cy="425741"/>
+          </a:xfrm>
+          <a:prstGeom prst="roundRect">
+            <a:avLst/>
+          </a:prstGeom>
+        </p:spPr>
+        <p:style>
+          <a:lnRef idx="2">
+            <a:schemeClr val="dk1"/>
+          </a:lnRef>
+          <a:fillRef idx="1">
+            <a:schemeClr val="lt1"/>
+          </a:fillRef>
+          <a:effectRef idx="0">
+            <a:schemeClr val="dk1"/>
+          </a:effectRef>
+          <a:fontRef idx="minor">
+            <a:schemeClr val="dk1"/>
+          </a:fontRef>
+        </p:style>
+        <p:txBody>
+          <a:bodyPr rtlCol="0" anchor="ctr"/>
+          <a:lstStyle/>
+          <a:p>
+            <a:pPr algn="ctr"/>
+            <a:r>
+              <a:rPr lang="zh-CN" altLang="en-US" sz="1200" dirty="0" smtClean="0">
+                <a:latin typeface="宋体" panose="02010600030101010101" pitchFamily="2" charset="-122"/>
+                <a:ea typeface="宋体" panose="02010600030101010101" pitchFamily="2" charset="-122"/>
+              </a:rPr>
+              <a:t>返回搜索结果链表头地址</a:t>
+            </a:r>
+            <a:endParaRPr lang="zh-CN" altLang="en-US" sz="1200" dirty="0">
+              <a:latin typeface="宋体" panose="02010600030101010101" pitchFamily="2" charset="-122"/>
+              <a:ea typeface="宋体" panose="02010600030101010101" pitchFamily="2" charset="-122"/>
+            </a:endParaRPr>
+          </a:p>
+        </p:txBody>
+      </p:sp>
+      <p:cxnSp>
+        <p:nvCxnSpPr>
+          <p:cNvPr id="48" name="肘形连接符 47"/>
+          <p:cNvCxnSpPr>
+            <a:stCxn id="17" idx="3"/>
+            <a:endCxn id="47" idx="0"/>
+          </p:cNvCxnSpPr>
+          <p:nvPr/>
+        </p:nvCxnSpPr>
+        <p:spPr>
+          <a:xfrm flipH="1">
+            <a:off x="2554288" y="3820213"/>
+            <a:ext cx="563561" cy="2320742"/>
+          </a:xfrm>
+          <a:prstGeom prst="bentConnector4">
+            <a:avLst>
+              <a:gd name="adj1" fmla="val -72113"/>
+              <a:gd name="adj2" fmla="val 89181"/>
+            </a:avLst>
+          </a:prstGeom>
+          <a:ln w="12700">
+            <a:tailEnd type="triangle"/>
+          </a:ln>
+        </p:spPr>
+        <p:style>
+          <a:lnRef idx="1">
+            <a:schemeClr val="dk1"/>
+          </a:lnRef>
+          <a:fillRef idx="0">
+            <a:schemeClr val="dk1"/>
+          </a:fillRef>
+          <a:effectRef idx="0">
+            <a:schemeClr val="dk1"/>
+          </a:effectRef>
+          <a:fontRef idx="minor">
+            <a:schemeClr val="tx1"/>
+          </a:fontRef>
+        </p:style>
+      </p:cxnSp>
+      <p:sp>
+        <p:nvSpPr>
+          <p:cNvPr id="53" name="文本框 52"/>
+          <p:cNvSpPr txBox="1"/>
+          <p:nvPr/>
+        </p:nvSpPr>
+        <p:spPr>
+          <a:xfrm>
+            <a:off x="2999884" y="3585566"/>
+            <a:ext cx="408125" cy="276999"/>
+          </a:xfrm>
+          <a:prstGeom prst="rect">
+            <a:avLst/>
+          </a:prstGeom>
+          <a:noFill/>
+        </p:spPr>
+        <p:txBody>
+          <a:bodyPr wrap="none" rtlCol="0">
+            <a:spAutoFit/>
+          </a:bodyPr>
+          <a:lstStyle/>
+          <a:p>
+            <a:r>
+              <a:rPr lang="en-US" altLang="zh-CN" sz="1200" dirty="0" smtClean="0">
+                <a:latin typeface="Times New Roman" panose="02020603050405020304" pitchFamily="18" charset="0"/>
+                <a:ea typeface="宋体" panose="02010600030101010101" pitchFamily="2" charset="-122"/>
+                <a:cs typeface="Times New Roman" panose="02020603050405020304" pitchFamily="18" charset="0"/>
+              </a:rPr>
+              <a:t>Yes</a:t>
+            </a:r>
+            <a:endParaRPr lang="zh-CN" altLang="en-US" sz="1200" dirty="0">
+              <a:latin typeface="Times New Roman" panose="02020603050405020304" pitchFamily="18" charset="0"/>
+              <a:ea typeface="宋体" panose="02010600030101010101" pitchFamily="2" charset="-122"/>
+              <a:cs typeface="Times New Roman" panose="02020603050405020304" pitchFamily="18" charset="0"/>
+            </a:endParaRPr>
+          </a:p>
+        </p:txBody>
+      </p:sp>
+      <p:sp>
+        <p:nvSpPr>
+          <p:cNvPr id="54" name="文本框 53"/>
+          <p:cNvSpPr txBox="1"/>
+          <p:nvPr/>
+        </p:nvSpPr>
+        <p:spPr>
+          <a:xfrm>
+            <a:off x="2501001" y="2268643"/>
+            <a:ext cx="408125" cy="276999"/>
+          </a:xfrm>
+          <a:prstGeom prst="rect">
+            <a:avLst/>
+          </a:prstGeom>
+          <a:noFill/>
+        </p:spPr>
+        <p:txBody>
+          <a:bodyPr wrap="none" rtlCol="0">
+            <a:spAutoFit/>
+          </a:bodyPr>
+          <a:lstStyle/>
+          <a:p>
+            <a:r>
+              <a:rPr lang="en-US" altLang="zh-CN" sz="1200" dirty="0" smtClean="0">
+                <a:latin typeface="Times New Roman" panose="02020603050405020304" pitchFamily="18" charset="0"/>
+                <a:ea typeface="宋体" panose="02010600030101010101" pitchFamily="2" charset="-122"/>
+                <a:cs typeface="Times New Roman" panose="02020603050405020304" pitchFamily="18" charset="0"/>
+              </a:rPr>
+              <a:t>Yes</a:t>
+            </a:r>
+            <a:endParaRPr lang="zh-CN" altLang="en-US" sz="1200" dirty="0">
+              <a:latin typeface="Times New Roman" panose="02020603050405020304" pitchFamily="18" charset="0"/>
+              <a:ea typeface="宋体" panose="02010600030101010101" pitchFamily="2" charset="-122"/>
+              <a:cs typeface="Times New Roman" panose="02020603050405020304" pitchFamily="18" charset="0"/>
+            </a:endParaRPr>
+          </a:p>
+        </p:txBody>
+      </p:sp>
+      <p:sp>
+        <p:nvSpPr>
+          <p:cNvPr id="55" name="文本框 54"/>
+          <p:cNvSpPr txBox="1"/>
+          <p:nvPr/>
+        </p:nvSpPr>
+        <p:spPr>
+          <a:xfrm>
+            <a:off x="1485688" y="1684021"/>
+            <a:ext cx="372218" cy="276999"/>
+          </a:xfrm>
+          <a:prstGeom prst="rect">
+            <a:avLst/>
+          </a:prstGeom>
+          <a:noFill/>
+        </p:spPr>
+        <p:txBody>
+          <a:bodyPr wrap="none" rtlCol="0">
+            <a:spAutoFit/>
+          </a:bodyPr>
+          <a:lstStyle/>
+          <a:p>
+            <a:r>
+              <a:rPr lang="en-US" altLang="zh-CN" sz="1200" dirty="0" smtClean="0">
+                <a:latin typeface="Times New Roman" panose="02020603050405020304" pitchFamily="18" charset="0"/>
+                <a:ea typeface="宋体" panose="02010600030101010101" pitchFamily="2" charset="-122"/>
+                <a:cs typeface="Times New Roman" panose="02020603050405020304" pitchFamily="18" charset="0"/>
+              </a:rPr>
+              <a:t>No</a:t>
+            </a:r>
+            <a:endParaRPr lang="zh-CN" altLang="en-US" sz="1200" dirty="0">
+              <a:latin typeface="Times New Roman" panose="02020603050405020304" pitchFamily="18" charset="0"/>
+              <a:ea typeface="宋体" panose="02010600030101010101" pitchFamily="2" charset="-122"/>
+              <a:cs typeface="Times New Roman" panose="02020603050405020304" pitchFamily="18" charset="0"/>
+            </a:endParaRPr>
+          </a:p>
+        </p:txBody>
+      </p:sp>
+      <p:cxnSp>
+        <p:nvCxnSpPr>
+          <p:cNvPr id="56" name="肘形连接符 55"/>
+          <p:cNvCxnSpPr>
+            <a:stCxn id="10" idx="1"/>
+            <a:endCxn id="47" idx="0"/>
+          </p:cNvCxnSpPr>
+          <p:nvPr/>
+        </p:nvCxnSpPr>
+        <p:spPr>
+          <a:xfrm rot="10800000" flipH="1" flipV="1">
+            <a:off x="1751544" y="1909777"/>
+            <a:ext cx="802743" cy="4231178"/>
+          </a:xfrm>
+          <a:prstGeom prst="bentConnector4">
+            <a:avLst>
+              <a:gd name="adj1" fmla="val -58009"/>
+              <a:gd name="adj2" fmla="val 93907"/>
+            </a:avLst>
+          </a:prstGeom>
+          <a:ln w="12700">
+            <a:tailEnd type="triangle"/>
+          </a:ln>
+        </p:spPr>
+        <p:style>
+          <a:lnRef idx="1">
+            <a:schemeClr val="dk1"/>
+          </a:lnRef>
+          <a:fillRef idx="0">
+            <a:schemeClr val="dk1"/>
+          </a:fillRef>
+          <a:effectRef idx="0">
+            <a:schemeClr val="dk1"/>
+          </a:effectRef>
+          <a:fontRef idx="minor">
+            <a:schemeClr val="tx1"/>
+          </a:fontRef>
+        </p:style>
+      </p:cxnSp>
+      <p:cxnSp>
+        <p:nvCxnSpPr>
+          <p:cNvPr id="67" name="肘形连接符 66"/>
+          <p:cNvCxnSpPr>
+            <a:stCxn id="40" idx="1"/>
+          </p:cNvCxnSpPr>
+          <p:nvPr/>
+        </p:nvCxnSpPr>
+        <p:spPr>
+          <a:xfrm rot="10800000">
+            <a:off x="1449867" y="4393716"/>
+            <a:ext cx="533187" cy="1089771"/>
+          </a:xfrm>
+          <a:prstGeom prst="bentConnector2">
+            <a:avLst/>
+          </a:prstGeom>
+          <a:ln w="12700">
+            <a:headEnd type="none" w="med" len="med"/>
+            <a:tailEnd type="none" w="med" len="med"/>
+          </a:ln>
+        </p:spPr>
+        <p:style>
+          <a:lnRef idx="1">
+            <a:schemeClr val="dk1"/>
+          </a:lnRef>
+          <a:fillRef idx="0">
+            <a:schemeClr val="dk1"/>
+          </a:fillRef>
+          <a:effectRef idx="0">
+            <a:schemeClr val="dk1"/>
+          </a:effectRef>
+          <a:fontRef idx="minor">
+            <a:schemeClr val="tx1"/>
+          </a:fontRef>
+        </p:style>
+      </p:cxnSp>
+    </p:spTree>
+    <p:extLst>
+      <p:ext uri="{BB962C8B-B14F-4D97-AF65-F5344CB8AC3E}">
+        <p14:creationId xmlns:p14="http://schemas.microsoft.com/office/powerpoint/2010/main" val="827937266"/>
+      </p:ext>
+    </p:extLst>
+  </p:cSld>
+  <p:clrMapOvr>
+    <a:masterClrMapping/>
+  </p:clrMapOvr>
+  <p:timing>
+    <p:tnLst>
+      <p:par>
+        <p:cTn id="1" dur="indefinite" restart="never" nodeType="tmRoot"/>
+      </p:par>
+    </p:tnLst>
+  </p:timing>
+</p:sld>
+</file>
+
+<file path=ppt/slides/slide11.xml><?xml version="1.0" encoding="utf-8"?>
+<p:sld xmlns:a="http://schemas.openxmlformats.org/drawingml/2006/main" xmlns:r="http://schemas.openxmlformats.org/officeDocument/2006/relationships" xmlns:p="http://schemas.openxmlformats.org/presentationml/2006/main">
+  <p:cSld>
+    <p:spTree>
+      <p:nvGrpSpPr>
+        <p:cNvPr id="1" name=""/>
+        <p:cNvGrpSpPr/>
+        <p:nvPr/>
+      </p:nvGrpSpPr>
+      <p:grpSpPr>
+        <a:xfrm>
+          <a:off x="0" y="0"/>
+          <a:ext cx="0" cy="0"/>
+          <a:chOff x="0" y="0"/>
+          <a:chExt cx="0" cy="0"/>
+        </a:xfrm>
+      </p:grpSpPr>
+      <p:grpSp>
+        <p:nvGrpSpPr>
+          <p:cNvPr id="145" name="组合 144"/>
+          <p:cNvGrpSpPr/>
+          <p:nvPr/>
+        </p:nvGrpSpPr>
+        <p:grpSpPr>
+          <a:xfrm>
+            <a:off x="954087" y="515822"/>
+            <a:ext cx="3200400" cy="6013597"/>
+            <a:chOff x="954087" y="515822"/>
+            <a:chExt cx="3200400" cy="6013597"/>
+          </a:xfrm>
+        </p:grpSpPr>
+        <p:sp>
+          <p:nvSpPr>
+            <p:cNvPr id="4" name="圆角矩形 3"/>
+            <p:cNvSpPr/>
+            <p:nvPr/>
+          </p:nvSpPr>
+          <p:spPr>
+            <a:xfrm>
+              <a:off x="954087" y="515822"/>
+              <a:ext cx="3200400" cy="254000"/>
+            </a:xfrm>
+            <a:prstGeom prst="roundRect">
+              <a:avLst/>
+            </a:prstGeom>
+          </p:spPr>
+          <p:style>
+            <a:lnRef idx="2">
+              <a:schemeClr val="dk1"/>
+            </a:lnRef>
+            <a:fillRef idx="1">
+              <a:schemeClr val="lt1"/>
+            </a:fillRef>
+            <a:effectRef idx="0">
+              <a:schemeClr val="dk1"/>
+            </a:effectRef>
+            <a:fontRef idx="minor">
+              <a:schemeClr val="dk1"/>
+            </a:fontRef>
+          </p:style>
+          <p:txBody>
+            <a:bodyPr rtlCol="0" anchor="ctr"/>
+            <a:lstStyle/>
+            <a:p>
+              <a:pPr algn="ctr"/>
+              <a:r>
+                <a:rPr lang="zh-CN" altLang="en-US" sz="1200" dirty="0" smtClean="0">
+                  <a:latin typeface="宋体" panose="02010600030101010101" pitchFamily="2" charset="-122"/>
+                  <a:ea typeface="宋体" panose="02010600030101010101" pitchFamily="2" charset="-122"/>
+                </a:rPr>
+                <a:t>进入</a:t>
+              </a:r>
+              <a:r>
+                <a:rPr lang="en-US" altLang="zh-CN" sz="1200" dirty="0" err="1" smtClean="0">
+                  <a:latin typeface="宋体" panose="02010600030101010101" pitchFamily="2" charset="-122"/>
+                  <a:ea typeface="宋体" panose="02010600030101010101" pitchFamily="2" charset="-122"/>
+                </a:rPr>
+                <a:t>buildDepartStatChainUnordered</a:t>
+              </a:r>
+              <a:r>
+                <a:rPr lang="en-US" altLang="zh-CN" sz="1200" dirty="0" smtClean="0">
+                  <a:latin typeface="宋体" panose="02010600030101010101" pitchFamily="2" charset="-122"/>
+                  <a:ea typeface="宋体" panose="02010600030101010101" pitchFamily="2" charset="-122"/>
+                </a:rPr>
+                <a:t>()</a:t>
+              </a:r>
+              <a:r>
+                <a:rPr lang="zh-CN" altLang="en-US" sz="1200" dirty="0" smtClean="0">
+                  <a:latin typeface="宋体" panose="02010600030101010101" pitchFamily="2" charset="-122"/>
+                  <a:ea typeface="宋体" panose="02010600030101010101" pitchFamily="2" charset="-122"/>
+                </a:rPr>
+                <a:t>函数</a:t>
+              </a:r>
+              <a:endParaRPr lang="zh-CN" altLang="en-US" sz="1200" dirty="0">
+                <a:latin typeface="宋体" panose="02010600030101010101" pitchFamily="2" charset="-122"/>
+                <a:ea typeface="宋体" panose="02010600030101010101" pitchFamily="2" charset="-122"/>
+              </a:endParaRPr>
+            </a:p>
+          </p:txBody>
+        </p:sp>
+        <p:sp>
+          <p:nvSpPr>
+            <p:cNvPr id="5" name="圆角矩形 4"/>
+            <p:cNvSpPr/>
+            <p:nvPr/>
+          </p:nvSpPr>
+          <p:spPr>
+            <a:xfrm>
+              <a:off x="1756833" y="1005145"/>
+              <a:ext cx="1600200" cy="254000"/>
+            </a:xfrm>
+            <a:prstGeom prst="roundRect">
+              <a:avLst/>
+            </a:prstGeom>
+          </p:spPr>
+          <p:style>
+            <a:lnRef idx="2">
+              <a:schemeClr val="dk1"/>
+            </a:lnRef>
+            <a:fillRef idx="1">
+              <a:schemeClr val="lt1"/>
+            </a:fillRef>
+            <a:effectRef idx="0">
+              <a:schemeClr val="dk1"/>
+            </a:effectRef>
+            <a:fontRef idx="minor">
+              <a:schemeClr val="dk1"/>
+            </a:fontRef>
+          </p:style>
+          <p:txBody>
+            <a:bodyPr rtlCol="0" anchor="ctr"/>
+            <a:lstStyle/>
+            <a:p>
+              <a:pPr algn="ctr"/>
+              <a:r>
+                <a:rPr lang="zh-CN" altLang="en-US" sz="1200" dirty="0" smtClean="0">
+                  <a:latin typeface="宋体" panose="02010600030101010101" pitchFamily="2" charset="-122"/>
+                  <a:ea typeface="宋体" panose="02010600030101010101" pitchFamily="2" charset="-122"/>
+                </a:rPr>
+                <a:t>创建</a:t>
+              </a:r>
+              <a:r>
+                <a:rPr lang="zh-CN" altLang="en-US" sz="1200" dirty="0">
+                  <a:latin typeface="宋体" panose="02010600030101010101" pitchFamily="2" charset="-122"/>
+                  <a:ea typeface="宋体" panose="02010600030101010101" pitchFamily="2" charset="-122"/>
+                </a:rPr>
+                <a:t>统计</a:t>
+              </a:r>
+              <a:r>
+                <a:rPr lang="zh-CN" altLang="en-US" sz="1200" dirty="0" smtClean="0">
+                  <a:latin typeface="宋体" panose="02010600030101010101" pitchFamily="2" charset="-122"/>
+                  <a:ea typeface="宋体" panose="02010600030101010101" pitchFamily="2" charset="-122"/>
+                </a:rPr>
+                <a:t>结果挂载点</a:t>
+              </a:r>
+              <a:endParaRPr lang="zh-CN" altLang="en-US" sz="1200" dirty="0">
+                <a:latin typeface="宋体" panose="02010600030101010101" pitchFamily="2" charset="-122"/>
+                <a:ea typeface="宋体" panose="02010600030101010101" pitchFamily="2" charset="-122"/>
+              </a:endParaRPr>
+            </a:p>
+          </p:txBody>
+        </p:sp>
+        <p:cxnSp>
+          <p:nvCxnSpPr>
+            <p:cNvPr id="6" name="直接箭头连接符 5"/>
+            <p:cNvCxnSpPr>
+              <a:stCxn id="4" idx="2"/>
+              <a:endCxn id="5" idx="0"/>
+            </p:cNvCxnSpPr>
+            <p:nvPr/>
+          </p:nvCxnSpPr>
+          <p:spPr>
+            <a:xfrm>
+              <a:off x="2554287" y="769822"/>
+              <a:ext cx="2646" cy="235323"/>
+            </a:xfrm>
+            <a:prstGeom prst="straightConnector1">
+              <a:avLst/>
+            </a:prstGeom>
+            <a:ln w="12700">
+              <a:tailEnd type="triangle"/>
+            </a:ln>
+          </p:spPr>
+          <p:style>
+            <a:lnRef idx="1">
+              <a:schemeClr val="dk1"/>
+            </a:lnRef>
+            <a:fillRef idx="0">
+              <a:schemeClr val="dk1"/>
+            </a:fillRef>
+            <a:effectRef idx="0">
+              <a:schemeClr val="dk1"/>
+            </a:effectRef>
+            <a:fontRef idx="minor">
+              <a:schemeClr val="tx1"/>
+            </a:fontRef>
+          </p:style>
+        </p:cxnSp>
+        <p:sp>
+          <p:nvSpPr>
+            <p:cNvPr id="7" name="流程图: 决策 6"/>
+            <p:cNvSpPr/>
+            <p:nvPr/>
+          </p:nvSpPr>
+          <p:spPr>
+            <a:xfrm>
+              <a:off x="1751545" y="1496211"/>
+              <a:ext cx="1605488" cy="827132"/>
+            </a:xfrm>
+            <a:prstGeom prst="flowChartDecision">
+              <a:avLst/>
+            </a:prstGeom>
+          </p:spPr>
+          <p:style>
+            <a:lnRef idx="2">
+              <a:schemeClr val="dk1"/>
+            </a:lnRef>
+            <a:fillRef idx="1">
+              <a:schemeClr val="lt1"/>
+            </a:fillRef>
+            <a:effectRef idx="0">
+              <a:schemeClr val="dk1"/>
+            </a:effectRef>
+            <a:fontRef idx="minor">
+              <a:schemeClr val="dk1"/>
+            </a:fontRef>
+          </p:style>
+          <p:txBody>
+            <a:bodyPr rtlCol="0" anchor="ctr"/>
+            <a:lstStyle/>
+            <a:p>
+              <a:pPr lvl="0" algn="ctr"/>
+              <a:r>
+                <a:rPr lang="zh-CN" altLang="en-US" sz="1200" dirty="0" smtClean="0">
+                  <a:solidFill>
+                    <a:prstClr val="black"/>
+                  </a:solidFill>
+                  <a:latin typeface="宋体" panose="02010600030101010101" pitchFamily="2" charset="-122"/>
+                  <a:ea typeface="宋体" panose="02010600030101010101" pitchFamily="2" charset="-122"/>
+                </a:rPr>
+                <a:t>检查传入链表是否有数据？</a:t>
+              </a:r>
+              <a:endParaRPr lang="zh-CN" altLang="en-US" sz="1200" dirty="0">
+                <a:solidFill>
+                  <a:prstClr val="black"/>
+                </a:solidFill>
+                <a:latin typeface="宋体" panose="02010600030101010101" pitchFamily="2" charset="-122"/>
+                <a:ea typeface="宋体" panose="02010600030101010101" pitchFamily="2" charset="-122"/>
+              </a:endParaRPr>
+            </a:p>
+          </p:txBody>
+        </p:sp>
+        <p:cxnSp>
+          <p:nvCxnSpPr>
+            <p:cNvPr id="8" name="直接箭头连接符 7"/>
+            <p:cNvCxnSpPr>
+              <a:stCxn id="5" idx="2"/>
+              <a:endCxn id="7" idx="0"/>
+            </p:cNvCxnSpPr>
+            <p:nvPr/>
+          </p:nvCxnSpPr>
+          <p:spPr>
+            <a:xfrm flipH="1">
+              <a:off x="2554289" y="1259145"/>
+              <a:ext cx="2644" cy="237066"/>
+            </a:xfrm>
+            <a:prstGeom prst="straightConnector1">
+              <a:avLst/>
+            </a:prstGeom>
+            <a:ln w="12700">
+              <a:tailEnd type="triangle"/>
+            </a:ln>
+          </p:spPr>
+          <p:style>
+            <a:lnRef idx="1">
+              <a:schemeClr val="dk1"/>
+            </a:lnRef>
+            <a:fillRef idx="0">
+              <a:schemeClr val="dk1"/>
+            </a:fillRef>
+            <a:effectRef idx="0">
+              <a:schemeClr val="dk1"/>
+            </a:effectRef>
+            <a:fontRef idx="minor">
+              <a:schemeClr val="tx1"/>
+            </a:fontRef>
+          </p:style>
+        </p:cxnSp>
+        <p:sp>
+          <p:nvSpPr>
+            <p:cNvPr id="9" name="圆角矩形 8"/>
+            <p:cNvSpPr/>
+            <p:nvPr/>
+          </p:nvSpPr>
+          <p:spPr>
+            <a:xfrm>
+              <a:off x="1837270" y="2559103"/>
+              <a:ext cx="1434038" cy="254000"/>
+            </a:xfrm>
+            <a:prstGeom prst="roundRect">
+              <a:avLst/>
+            </a:prstGeom>
+          </p:spPr>
+          <p:style>
+            <a:lnRef idx="2">
+              <a:schemeClr val="dk1"/>
+            </a:lnRef>
+            <a:fillRef idx="1">
+              <a:schemeClr val="lt1"/>
+            </a:fillRef>
+            <a:effectRef idx="0">
+              <a:schemeClr val="dk1"/>
+            </a:effectRef>
+            <a:fontRef idx="minor">
+              <a:schemeClr val="dk1"/>
+            </a:fontRef>
+          </p:style>
+          <p:txBody>
+            <a:bodyPr rtlCol="0" anchor="ctr"/>
+            <a:lstStyle/>
+            <a:p>
+              <a:pPr algn="ctr"/>
+              <a:r>
+                <a:rPr lang="zh-CN" altLang="en-US" sz="1200" dirty="0" smtClean="0">
+                  <a:latin typeface="宋体" panose="02010600030101010101" pitchFamily="2" charset="-122"/>
+                  <a:ea typeface="宋体" panose="02010600030101010101" pitchFamily="2" charset="-122"/>
+                </a:rPr>
+                <a:t>开始遍历院系链表</a:t>
+              </a:r>
+              <a:endParaRPr lang="zh-CN" altLang="en-US" sz="1200" dirty="0">
+                <a:latin typeface="宋体" panose="02010600030101010101" pitchFamily="2" charset="-122"/>
+                <a:ea typeface="宋体" panose="02010600030101010101" pitchFamily="2" charset="-122"/>
+              </a:endParaRPr>
+            </a:p>
+          </p:txBody>
+        </p:sp>
+        <p:sp>
+          <p:nvSpPr>
+            <p:cNvPr id="10" name="流程图: 决策 9"/>
+            <p:cNvSpPr/>
+            <p:nvPr/>
+          </p:nvSpPr>
+          <p:spPr>
+            <a:xfrm>
+              <a:off x="1990726" y="3646723"/>
+              <a:ext cx="1127121" cy="555343"/>
+            </a:xfrm>
+            <a:prstGeom prst="flowChartDecision">
+              <a:avLst/>
+            </a:prstGeom>
+          </p:spPr>
+          <p:style>
+            <a:lnRef idx="2">
+              <a:schemeClr val="dk1"/>
+            </a:lnRef>
+            <a:fillRef idx="1">
+              <a:schemeClr val="lt1"/>
+            </a:fillRef>
+            <a:effectRef idx="0">
+              <a:schemeClr val="dk1"/>
+            </a:effectRef>
+            <a:fontRef idx="minor">
+              <a:schemeClr val="dk1"/>
+            </a:fontRef>
+          </p:style>
+          <p:txBody>
+            <a:bodyPr rtlCol="0" anchor="ctr"/>
+            <a:lstStyle/>
+            <a:p>
+              <a:pPr lvl="0" algn="ctr"/>
+              <a:r>
+                <a:rPr lang="zh-CN" altLang="en-US" sz="1200" dirty="0" smtClean="0">
+                  <a:solidFill>
+                    <a:prstClr val="black"/>
+                  </a:solidFill>
+                  <a:latin typeface="宋体" panose="02010600030101010101" pitchFamily="2" charset="-122"/>
+                  <a:ea typeface="宋体" panose="02010600030101010101" pitchFamily="2" charset="-122"/>
+                </a:rPr>
+                <a:t>遍历完毕？</a:t>
+              </a:r>
+              <a:endParaRPr lang="zh-CN" altLang="en-US" sz="1200" dirty="0">
+                <a:solidFill>
+                  <a:prstClr val="black"/>
+                </a:solidFill>
+                <a:latin typeface="宋体" panose="02010600030101010101" pitchFamily="2" charset="-122"/>
+                <a:ea typeface="宋体" panose="02010600030101010101" pitchFamily="2" charset="-122"/>
+              </a:endParaRPr>
+            </a:p>
+          </p:txBody>
+        </p:sp>
+        <p:sp>
+          <p:nvSpPr>
+            <p:cNvPr id="11" name="圆角矩形 10"/>
+            <p:cNvSpPr/>
+            <p:nvPr/>
+          </p:nvSpPr>
+          <p:spPr>
+            <a:xfrm>
+              <a:off x="1821922" y="3048863"/>
+              <a:ext cx="1464730" cy="362100"/>
+            </a:xfrm>
+            <a:prstGeom prst="roundRect">
+              <a:avLst/>
+            </a:prstGeom>
+          </p:spPr>
+          <p:style>
+            <a:lnRef idx="2">
+              <a:schemeClr val="dk1"/>
+            </a:lnRef>
+            <a:fillRef idx="1">
+              <a:schemeClr val="lt1"/>
+            </a:fillRef>
+            <a:effectRef idx="0">
+              <a:schemeClr val="dk1"/>
+            </a:effectRef>
+            <a:fontRef idx="minor">
+              <a:schemeClr val="dk1"/>
+            </a:fontRef>
+          </p:style>
+          <p:txBody>
+            <a:bodyPr rtlCol="0" anchor="ctr"/>
+            <a:lstStyle/>
+            <a:p>
+              <a:pPr algn="ctr"/>
+              <a:r>
+                <a:rPr lang="zh-CN" altLang="en-US" sz="1200" dirty="0" smtClean="0">
+                  <a:latin typeface="宋体" panose="02010600030101010101" pitchFamily="2" charset="-122"/>
+                  <a:ea typeface="宋体" panose="02010600030101010101" pitchFamily="2" charset="-122"/>
+                </a:rPr>
+                <a:t>向头节点写入第一个院系的统计信息</a:t>
+              </a:r>
+              <a:endParaRPr lang="zh-CN" altLang="en-US" sz="1200" dirty="0">
+                <a:latin typeface="宋体" panose="02010600030101010101" pitchFamily="2" charset="-122"/>
+                <a:ea typeface="宋体" panose="02010600030101010101" pitchFamily="2" charset="-122"/>
+              </a:endParaRPr>
+            </a:p>
+          </p:txBody>
+        </p:sp>
+        <p:cxnSp>
+          <p:nvCxnSpPr>
+            <p:cNvPr id="12" name="直接箭头连接符 11"/>
+            <p:cNvCxnSpPr>
+              <a:stCxn id="7" idx="2"/>
+              <a:endCxn id="9" idx="0"/>
+            </p:cNvCxnSpPr>
+            <p:nvPr/>
+          </p:nvCxnSpPr>
+          <p:spPr>
+            <a:xfrm>
+              <a:off x="2554289" y="2323343"/>
+              <a:ext cx="0" cy="235760"/>
+            </a:xfrm>
+            <a:prstGeom prst="straightConnector1">
+              <a:avLst/>
+            </a:prstGeom>
+            <a:ln w="12700">
+              <a:tailEnd type="triangle"/>
+            </a:ln>
+          </p:spPr>
+          <p:style>
+            <a:lnRef idx="1">
+              <a:schemeClr val="dk1"/>
+            </a:lnRef>
+            <a:fillRef idx="0">
+              <a:schemeClr val="dk1"/>
+            </a:fillRef>
+            <a:effectRef idx="0">
+              <a:schemeClr val="dk1"/>
+            </a:effectRef>
+            <a:fontRef idx="minor">
+              <a:schemeClr val="tx1"/>
+            </a:fontRef>
+          </p:style>
+        </p:cxnSp>
+        <p:cxnSp>
+          <p:nvCxnSpPr>
+            <p:cNvPr id="13" name="直接箭头连接符 12"/>
+            <p:cNvCxnSpPr>
+              <a:stCxn id="9" idx="2"/>
+              <a:endCxn id="11" idx="0"/>
+            </p:cNvCxnSpPr>
+            <p:nvPr/>
+          </p:nvCxnSpPr>
+          <p:spPr>
+            <a:xfrm flipH="1">
+              <a:off x="2554287" y="2813103"/>
+              <a:ext cx="2" cy="235760"/>
+            </a:xfrm>
+            <a:prstGeom prst="straightConnector1">
+              <a:avLst/>
+            </a:prstGeom>
+            <a:ln w="12700">
+              <a:tailEnd type="triangle"/>
+            </a:ln>
+          </p:spPr>
+          <p:style>
+            <a:lnRef idx="1">
+              <a:schemeClr val="dk1"/>
+            </a:lnRef>
+            <a:fillRef idx="0">
+              <a:schemeClr val="dk1"/>
+            </a:fillRef>
+            <a:effectRef idx="0">
+              <a:schemeClr val="dk1"/>
+            </a:effectRef>
+            <a:fontRef idx="minor">
+              <a:schemeClr val="tx1"/>
+            </a:fontRef>
+          </p:style>
+        </p:cxnSp>
+        <p:cxnSp>
+          <p:nvCxnSpPr>
+            <p:cNvPr id="14" name="直接箭头连接符 13"/>
+            <p:cNvCxnSpPr>
+              <a:stCxn id="11" idx="2"/>
+              <a:endCxn id="10" idx="0"/>
+            </p:cNvCxnSpPr>
+            <p:nvPr/>
+          </p:nvCxnSpPr>
+          <p:spPr>
+            <a:xfrm>
+              <a:off x="2554287" y="3410963"/>
+              <a:ext cx="0" cy="235760"/>
+            </a:xfrm>
+            <a:prstGeom prst="straightConnector1">
+              <a:avLst/>
+            </a:prstGeom>
+            <a:ln w="12700">
+              <a:tailEnd type="triangle"/>
+            </a:ln>
+          </p:spPr>
+          <p:style>
+            <a:lnRef idx="1">
+              <a:schemeClr val="dk1"/>
+            </a:lnRef>
+            <a:fillRef idx="0">
+              <a:schemeClr val="dk1"/>
+            </a:fillRef>
+            <a:effectRef idx="0">
+              <a:schemeClr val="dk1"/>
+            </a:effectRef>
+            <a:fontRef idx="minor">
+              <a:schemeClr val="tx1"/>
+            </a:fontRef>
+          </p:style>
+        </p:cxnSp>
+        <p:sp>
+          <p:nvSpPr>
+            <p:cNvPr id="26" name="文本框 25"/>
+            <p:cNvSpPr txBox="1"/>
+            <p:nvPr/>
+          </p:nvSpPr>
+          <p:spPr>
+            <a:xfrm>
+              <a:off x="2501001" y="2268643"/>
+              <a:ext cx="408125" cy="276999"/>
+            </a:xfrm>
+            <a:prstGeom prst="rect">
+              <a:avLst/>
+            </a:prstGeom>
+            <a:noFill/>
+          </p:spPr>
+          <p:txBody>
+            <a:bodyPr wrap="none" rtlCol="0">
+              <a:spAutoFit/>
+            </a:bodyPr>
+            <a:lstStyle/>
+            <a:p>
+              <a:r>
+                <a:rPr lang="en-US" altLang="zh-CN" sz="1200" dirty="0" smtClean="0">
+                  <a:latin typeface="Times New Roman" panose="02020603050405020304" pitchFamily="18" charset="0"/>
+                  <a:ea typeface="宋体" panose="02010600030101010101" pitchFamily="2" charset="-122"/>
+                  <a:cs typeface="Times New Roman" panose="02020603050405020304" pitchFamily="18" charset="0"/>
+                </a:rPr>
+                <a:t>Yes</a:t>
+              </a:r>
+              <a:endParaRPr lang="zh-CN" altLang="en-US" sz="1200" dirty="0">
+                <a:latin typeface="Times New Roman" panose="02020603050405020304" pitchFamily="18" charset="0"/>
+                <a:ea typeface="宋体" panose="02010600030101010101" pitchFamily="2" charset="-122"/>
+                <a:cs typeface="Times New Roman" panose="02020603050405020304" pitchFamily="18" charset="0"/>
+              </a:endParaRPr>
+            </a:p>
+          </p:txBody>
+        </p:sp>
+        <p:sp>
+          <p:nvSpPr>
+            <p:cNvPr id="27" name="文本框 26"/>
+            <p:cNvSpPr txBox="1"/>
+            <p:nvPr/>
+          </p:nvSpPr>
+          <p:spPr>
+            <a:xfrm>
+              <a:off x="1465052" y="1670004"/>
+              <a:ext cx="372218" cy="276999"/>
+            </a:xfrm>
+            <a:prstGeom prst="rect">
+              <a:avLst/>
+            </a:prstGeom>
+            <a:noFill/>
+          </p:spPr>
+          <p:txBody>
+            <a:bodyPr wrap="none" rtlCol="0">
+              <a:spAutoFit/>
+            </a:bodyPr>
+            <a:lstStyle/>
+            <a:p>
+              <a:r>
+                <a:rPr lang="en-US" altLang="zh-CN" sz="1200" dirty="0" smtClean="0">
+                  <a:latin typeface="Times New Roman" panose="02020603050405020304" pitchFamily="18" charset="0"/>
+                  <a:ea typeface="宋体" panose="02010600030101010101" pitchFamily="2" charset="-122"/>
+                  <a:cs typeface="Times New Roman" panose="02020603050405020304" pitchFamily="18" charset="0"/>
+                </a:rPr>
+                <a:t>No</a:t>
+              </a:r>
+              <a:endParaRPr lang="zh-CN" altLang="en-US" sz="1200" dirty="0">
+                <a:latin typeface="Times New Roman" panose="02020603050405020304" pitchFamily="18" charset="0"/>
+                <a:ea typeface="宋体" panose="02010600030101010101" pitchFamily="2" charset="-122"/>
+                <a:cs typeface="Times New Roman" panose="02020603050405020304" pitchFamily="18" charset="0"/>
+              </a:endParaRPr>
+            </a:p>
+          </p:txBody>
+        </p:sp>
+        <p:sp>
+          <p:nvSpPr>
+            <p:cNvPr id="49" name="圆角矩形 48"/>
+            <p:cNvSpPr/>
+            <p:nvPr/>
+          </p:nvSpPr>
+          <p:spPr>
+            <a:xfrm>
+              <a:off x="1821922" y="4437826"/>
+              <a:ext cx="1464731" cy="391636"/>
+            </a:xfrm>
+            <a:prstGeom prst="roundRect">
+              <a:avLst/>
+            </a:prstGeom>
+          </p:spPr>
+          <p:style>
+            <a:lnRef idx="2">
+              <a:schemeClr val="dk1"/>
+            </a:lnRef>
+            <a:fillRef idx="1">
+              <a:schemeClr val="lt1"/>
+            </a:fillRef>
+            <a:effectRef idx="0">
+              <a:schemeClr val="dk1"/>
+            </a:effectRef>
+            <a:fontRef idx="minor">
+              <a:schemeClr val="dk1"/>
+            </a:fontRef>
+          </p:style>
+          <p:txBody>
+            <a:bodyPr rtlCol="0" anchor="ctr"/>
+            <a:lstStyle/>
+            <a:p>
+              <a:pPr algn="ctr"/>
+              <a:r>
+                <a:rPr lang="zh-CN" altLang="en-US" sz="1200" dirty="0" smtClean="0">
+                  <a:latin typeface="宋体" panose="02010600030101010101" pitchFamily="2" charset="-122"/>
+                  <a:ea typeface="宋体" panose="02010600030101010101" pitchFamily="2" charset="-122"/>
+                </a:rPr>
+                <a:t>创建下一个院系的统计结果挂载点</a:t>
+              </a:r>
+              <a:endParaRPr lang="zh-CN" altLang="en-US" sz="1200" dirty="0">
+                <a:latin typeface="宋体" panose="02010600030101010101" pitchFamily="2" charset="-122"/>
+                <a:ea typeface="宋体" panose="02010600030101010101" pitchFamily="2" charset="-122"/>
+              </a:endParaRPr>
+            </a:p>
+          </p:txBody>
+        </p:sp>
+        <p:cxnSp>
+          <p:nvCxnSpPr>
+            <p:cNvPr id="50" name="直接箭头连接符 49"/>
+            <p:cNvCxnSpPr>
+              <a:stCxn id="10" idx="2"/>
+              <a:endCxn id="49" idx="0"/>
+            </p:cNvCxnSpPr>
+            <p:nvPr/>
+          </p:nvCxnSpPr>
+          <p:spPr>
+            <a:xfrm>
+              <a:off x="2554287" y="4202066"/>
+              <a:ext cx="1" cy="235760"/>
+            </a:xfrm>
+            <a:prstGeom prst="straightConnector1">
+              <a:avLst/>
+            </a:prstGeom>
+            <a:ln w="12700">
+              <a:tailEnd type="triangle"/>
+            </a:ln>
+          </p:spPr>
+          <p:style>
+            <a:lnRef idx="1">
+              <a:schemeClr val="dk1"/>
+            </a:lnRef>
+            <a:fillRef idx="0">
+              <a:schemeClr val="dk1"/>
+            </a:fillRef>
+            <a:effectRef idx="0">
+              <a:schemeClr val="dk1"/>
+            </a:effectRef>
+            <a:fontRef idx="minor">
+              <a:schemeClr val="tx1"/>
+            </a:fontRef>
+          </p:style>
+        </p:cxnSp>
+        <p:sp>
+          <p:nvSpPr>
+            <p:cNvPr id="53" name="圆角矩形 52"/>
+            <p:cNvSpPr/>
+            <p:nvPr/>
+          </p:nvSpPr>
+          <p:spPr>
+            <a:xfrm>
+              <a:off x="2035518" y="5065222"/>
+              <a:ext cx="1037536" cy="362100"/>
+            </a:xfrm>
+            <a:prstGeom prst="roundRect">
+              <a:avLst/>
+            </a:prstGeom>
+            <a:ln>
+              <a:prstDash val="dash"/>
+            </a:ln>
+          </p:spPr>
+          <p:style>
+            <a:lnRef idx="2">
+              <a:schemeClr val="dk1"/>
+            </a:lnRef>
+            <a:fillRef idx="1">
+              <a:schemeClr val="lt1"/>
+            </a:fillRef>
+            <a:effectRef idx="0">
+              <a:schemeClr val="dk1"/>
+            </a:effectRef>
+            <a:fontRef idx="minor">
+              <a:schemeClr val="dk1"/>
+            </a:fontRef>
+          </p:style>
+          <p:txBody>
+            <a:bodyPr rtlCol="0" anchor="ctr"/>
+            <a:lstStyle/>
+            <a:p>
+              <a:pPr algn="ctr"/>
+              <a:r>
+                <a:rPr lang="zh-CN" altLang="en-US" sz="1200" dirty="0" smtClean="0">
+                  <a:latin typeface="宋体" panose="02010600030101010101" pitchFamily="2" charset="-122"/>
+                  <a:ea typeface="宋体" panose="02010600030101010101" pitchFamily="2" charset="-122"/>
+                </a:rPr>
+                <a:t>向节点中写入统计信息</a:t>
+              </a:r>
+              <a:endParaRPr lang="zh-CN" altLang="en-US" sz="1200" dirty="0">
+                <a:latin typeface="宋体" panose="02010600030101010101" pitchFamily="2" charset="-122"/>
+                <a:ea typeface="宋体" panose="02010600030101010101" pitchFamily="2" charset="-122"/>
+              </a:endParaRPr>
+            </a:p>
+          </p:txBody>
+        </p:sp>
+        <p:cxnSp>
+          <p:nvCxnSpPr>
+            <p:cNvPr id="54" name="直接箭头连接符 53"/>
+            <p:cNvCxnSpPr>
+              <a:stCxn id="49" idx="2"/>
+              <a:endCxn id="53" idx="0"/>
+            </p:cNvCxnSpPr>
+            <p:nvPr/>
+          </p:nvCxnSpPr>
+          <p:spPr>
+            <a:xfrm flipH="1">
+              <a:off x="2554286" y="4829462"/>
+              <a:ext cx="2" cy="235760"/>
+            </a:xfrm>
+            <a:prstGeom prst="straightConnector1">
+              <a:avLst/>
+            </a:prstGeom>
+            <a:ln w="12700">
+              <a:tailEnd type="triangle"/>
+            </a:ln>
+          </p:spPr>
+          <p:style>
+            <a:lnRef idx="1">
+              <a:schemeClr val="dk1"/>
+            </a:lnRef>
+            <a:fillRef idx="0">
+              <a:schemeClr val="dk1"/>
+            </a:fillRef>
+            <a:effectRef idx="0">
+              <a:schemeClr val="dk1"/>
+            </a:effectRef>
+            <a:fontRef idx="minor">
+              <a:schemeClr val="tx1"/>
+            </a:fontRef>
+          </p:style>
+        </p:cxnSp>
+        <p:cxnSp>
+          <p:nvCxnSpPr>
+            <p:cNvPr id="57" name="肘形连接符 56"/>
+            <p:cNvCxnSpPr>
+              <a:stCxn id="53" idx="2"/>
+              <a:endCxn id="10" idx="1"/>
+            </p:cNvCxnSpPr>
+            <p:nvPr/>
+          </p:nvCxnSpPr>
+          <p:spPr>
+            <a:xfrm rot="5400000" flipH="1">
+              <a:off x="1521042" y="4394079"/>
+              <a:ext cx="1502927" cy="563560"/>
+            </a:xfrm>
+            <a:prstGeom prst="bentConnector4">
+              <a:avLst>
+                <a:gd name="adj1" fmla="val -15210"/>
+                <a:gd name="adj2" fmla="val 164601"/>
+              </a:avLst>
+            </a:prstGeom>
+            <a:ln w="12700">
+              <a:tailEnd type="triangle"/>
+            </a:ln>
+          </p:spPr>
+          <p:style>
+            <a:lnRef idx="1">
+              <a:schemeClr val="dk1"/>
+            </a:lnRef>
+            <a:fillRef idx="0">
+              <a:schemeClr val="dk1"/>
+            </a:fillRef>
+            <a:effectRef idx="0">
+              <a:schemeClr val="dk1"/>
+            </a:effectRef>
+            <a:fontRef idx="minor">
+              <a:schemeClr val="tx1"/>
+            </a:fontRef>
+          </p:style>
+        </p:cxnSp>
+        <p:sp>
+          <p:nvSpPr>
+            <p:cNvPr id="130" name="圆角矩形 129"/>
+            <p:cNvSpPr/>
+            <p:nvPr/>
+          </p:nvSpPr>
+          <p:spPr>
+            <a:xfrm>
+              <a:off x="1983051" y="6103678"/>
+              <a:ext cx="1142469" cy="425741"/>
+            </a:xfrm>
+            <a:prstGeom prst="roundRect">
+              <a:avLst/>
+            </a:prstGeom>
+          </p:spPr>
+          <p:style>
+            <a:lnRef idx="2">
+              <a:schemeClr val="dk1"/>
+            </a:lnRef>
+            <a:fillRef idx="1">
+              <a:schemeClr val="lt1"/>
+            </a:fillRef>
+            <a:effectRef idx="0">
+              <a:schemeClr val="dk1"/>
+            </a:effectRef>
+            <a:fontRef idx="minor">
+              <a:schemeClr val="dk1"/>
+            </a:fontRef>
+          </p:style>
+          <p:txBody>
+            <a:bodyPr rtlCol="0" anchor="ctr"/>
+            <a:lstStyle/>
+            <a:p>
+              <a:pPr algn="ctr"/>
+              <a:r>
+                <a:rPr lang="zh-CN" altLang="en-US" sz="1200" dirty="0" smtClean="0">
+                  <a:latin typeface="宋体" panose="02010600030101010101" pitchFamily="2" charset="-122"/>
+                  <a:ea typeface="宋体" panose="02010600030101010101" pitchFamily="2" charset="-122"/>
+                </a:rPr>
+                <a:t>返回统计结果链表头地址</a:t>
+              </a:r>
+              <a:endParaRPr lang="zh-CN" altLang="en-US" sz="1200" dirty="0">
+                <a:latin typeface="宋体" panose="02010600030101010101" pitchFamily="2" charset="-122"/>
+                <a:ea typeface="宋体" panose="02010600030101010101" pitchFamily="2" charset="-122"/>
+              </a:endParaRPr>
+            </a:p>
+          </p:txBody>
+        </p:sp>
+        <p:cxnSp>
+          <p:nvCxnSpPr>
+            <p:cNvPr id="131" name="肘形连接符 130"/>
+            <p:cNvCxnSpPr>
+              <a:stCxn id="10" idx="3"/>
+              <a:endCxn id="130" idx="0"/>
+            </p:cNvCxnSpPr>
+            <p:nvPr/>
+          </p:nvCxnSpPr>
+          <p:spPr>
+            <a:xfrm flipH="1">
+              <a:off x="2554286" y="3924395"/>
+              <a:ext cx="563561" cy="2179283"/>
+            </a:xfrm>
+            <a:prstGeom prst="bentConnector4">
+              <a:avLst>
+                <a:gd name="adj1" fmla="val -62892"/>
+                <a:gd name="adj2" fmla="val 88706"/>
+              </a:avLst>
+            </a:prstGeom>
+            <a:ln w="12700">
+              <a:tailEnd type="triangle"/>
+            </a:ln>
+          </p:spPr>
+          <p:style>
+            <a:lnRef idx="1">
+              <a:schemeClr val="dk1"/>
+            </a:lnRef>
+            <a:fillRef idx="0">
+              <a:schemeClr val="dk1"/>
+            </a:fillRef>
+            <a:effectRef idx="0">
+              <a:schemeClr val="dk1"/>
+            </a:effectRef>
+            <a:fontRef idx="minor">
+              <a:schemeClr val="tx1"/>
+            </a:fontRef>
+          </p:style>
+        </p:cxnSp>
+        <p:sp>
+          <p:nvSpPr>
+            <p:cNvPr id="136" name="文本框 135"/>
+            <p:cNvSpPr txBox="1"/>
+            <p:nvPr/>
+          </p:nvSpPr>
+          <p:spPr>
+            <a:xfrm>
+              <a:off x="2501001" y="4133939"/>
+              <a:ext cx="372218" cy="276999"/>
+            </a:xfrm>
+            <a:prstGeom prst="rect">
+              <a:avLst/>
+            </a:prstGeom>
+            <a:noFill/>
+          </p:spPr>
+          <p:txBody>
+            <a:bodyPr wrap="none" rtlCol="0">
+              <a:spAutoFit/>
+            </a:bodyPr>
+            <a:lstStyle/>
+            <a:p>
+              <a:r>
+                <a:rPr lang="en-US" altLang="zh-CN" sz="1200" dirty="0" smtClean="0">
+                  <a:latin typeface="Times New Roman" panose="02020603050405020304" pitchFamily="18" charset="0"/>
+                  <a:ea typeface="宋体" panose="02010600030101010101" pitchFamily="2" charset="-122"/>
+                  <a:cs typeface="Times New Roman" panose="02020603050405020304" pitchFamily="18" charset="0"/>
+                </a:rPr>
+                <a:t>No</a:t>
+              </a:r>
+              <a:endParaRPr lang="zh-CN" altLang="en-US" sz="1200" dirty="0">
+                <a:latin typeface="Times New Roman" panose="02020603050405020304" pitchFamily="18" charset="0"/>
+                <a:ea typeface="宋体" panose="02010600030101010101" pitchFamily="2" charset="-122"/>
+                <a:cs typeface="Times New Roman" panose="02020603050405020304" pitchFamily="18" charset="0"/>
+              </a:endParaRPr>
+            </a:p>
+          </p:txBody>
+        </p:sp>
+        <p:sp>
+          <p:nvSpPr>
+            <p:cNvPr id="137" name="文本框 136"/>
+            <p:cNvSpPr txBox="1"/>
+            <p:nvPr/>
+          </p:nvSpPr>
+          <p:spPr>
+            <a:xfrm>
+              <a:off x="3067245" y="3698158"/>
+              <a:ext cx="408125" cy="276999"/>
+            </a:xfrm>
+            <a:prstGeom prst="rect">
+              <a:avLst/>
+            </a:prstGeom>
+            <a:noFill/>
+          </p:spPr>
+          <p:txBody>
+            <a:bodyPr wrap="none" rtlCol="0">
+              <a:spAutoFit/>
+            </a:bodyPr>
+            <a:lstStyle/>
+            <a:p>
+              <a:r>
+                <a:rPr lang="en-US" altLang="zh-CN" sz="1200" dirty="0" smtClean="0">
+                  <a:latin typeface="Times New Roman" panose="02020603050405020304" pitchFamily="18" charset="0"/>
+                  <a:ea typeface="宋体" panose="02010600030101010101" pitchFamily="2" charset="-122"/>
+                  <a:cs typeface="Times New Roman" panose="02020603050405020304" pitchFamily="18" charset="0"/>
+                </a:rPr>
+                <a:t>Yes</a:t>
+              </a:r>
+              <a:endParaRPr lang="zh-CN" altLang="en-US" sz="1200" dirty="0">
+                <a:latin typeface="Times New Roman" panose="02020603050405020304" pitchFamily="18" charset="0"/>
+                <a:ea typeface="宋体" panose="02010600030101010101" pitchFamily="2" charset="-122"/>
+                <a:cs typeface="Times New Roman" panose="02020603050405020304" pitchFamily="18" charset="0"/>
+              </a:endParaRPr>
+            </a:p>
+          </p:txBody>
+        </p:sp>
+        <p:cxnSp>
+          <p:nvCxnSpPr>
+            <p:cNvPr id="139" name="肘形连接符 138"/>
+            <p:cNvCxnSpPr>
+              <a:stCxn id="7" idx="1"/>
+            </p:cNvCxnSpPr>
+            <p:nvPr/>
+          </p:nvCxnSpPr>
+          <p:spPr>
+            <a:xfrm rot="10800000" flipH="1" flipV="1">
+              <a:off x="1751544" y="1909777"/>
+              <a:ext cx="802741" cy="3954128"/>
+            </a:xfrm>
+            <a:prstGeom prst="bentConnector4">
+              <a:avLst>
+                <a:gd name="adj1" fmla="val -38927"/>
+                <a:gd name="adj2" fmla="val 99783"/>
+              </a:avLst>
+            </a:prstGeom>
+            <a:ln w="12700"/>
+          </p:spPr>
+          <p:style>
+            <a:lnRef idx="1">
+              <a:schemeClr val="dk1"/>
+            </a:lnRef>
+            <a:fillRef idx="0">
+              <a:schemeClr val="dk1"/>
+            </a:fillRef>
+            <a:effectRef idx="0">
+              <a:schemeClr val="dk1"/>
+            </a:effectRef>
+            <a:fontRef idx="minor">
+              <a:schemeClr val="tx1"/>
+            </a:fontRef>
+          </p:style>
+        </p:cxnSp>
+      </p:grpSp>
+      <p:grpSp>
+        <p:nvGrpSpPr>
+          <p:cNvPr id="159" name="组合 158"/>
+          <p:cNvGrpSpPr/>
+          <p:nvPr/>
+        </p:nvGrpSpPr>
+        <p:grpSpPr>
+          <a:xfrm>
+            <a:off x="3781583" y="1366006"/>
+            <a:ext cx="2366785" cy="4061316"/>
+            <a:chOff x="3857887" y="2470617"/>
+            <a:chExt cx="2366785" cy="4061316"/>
+          </a:xfrm>
+        </p:grpSpPr>
+        <p:grpSp>
+          <p:nvGrpSpPr>
+            <p:cNvPr id="155" name="组合 154"/>
+            <p:cNvGrpSpPr/>
+            <p:nvPr/>
+          </p:nvGrpSpPr>
+          <p:grpSpPr>
+            <a:xfrm>
+              <a:off x="3857887" y="2735354"/>
+              <a:ext cx="2366785" cy="3796579"/>
+              <a:chOff x="3445846" y="7369167"/>
+              <a:chExt cx="2366785" cy="3796579"/>
+            </a:xfrm>
+          </p:grpSpPr>
+          <p:cxnSp>
+            <p:nvCxnSpPr>
+              <p:cNvPr id="68" name="直接箭头连接符 67"/>
+              <p:cNvCxnSpPr>
+                <a:endCxn id="93" idx="0"/>
+              </p:cNvCxnSpPr>
+              <p:nvPr/>
+            </p:nvCxnSpPr>
+            <p:spPr>
+              <a:xfrm>
+                <a:off x="4576779" y="7369167"/>
+                <a:ext cx="1" cy="351375"/>
+              </a:xfrm>
+              <a:prstGeom prst="straightConnector1">
+                <a:avLst/>
+              </a:prstGeom>
+              <a:ln w="12700">
+                <a:headEnd type="oval" w="med" len="med"/>
+                <a:tailEnd type="triangle" w="med" len="med"/>
+              </a:ln>
+            </p:spPr>
+            <p:style>
+              <a:lnRef idx="1">
+                <a:schemeClr val="dk1"/>
+              </a:lnRef>
+              <a:fillRef idx="0">
+                <a:schemeClr val="dk1"/>
+              </a:fillRef>
+              <a:effectRef idx="0">
+                <a:schemeClr val="dk1"/>
+              </a:effectRef>
+              <a:fontRef idx="minor">
+                <a:schemeClr val="tx1"/>
+              </a:fontRef>
+            </p:style>
+          </p:cxnSp>
+          <p:sp>
+            <p:nvSpPr>
+              <p:cNvPr id="72" name="流程图: 决策 71"/>
+              <p:cNvSpPr/>
+              <p:nvPr/>
+            </p:nvSpPr>
+            <p:spPr>
+              <a:xfrm>
+                <a:off x="3932083" y="8217582"/>
+                <a:ext cx="1289394" cy="590267"/>
+              </a:xfrm>
+              <a:prstGeom prst="flowChartDecision">
+                <a:avLst/>
+              </a:prstGeom>
+            </p:spPr>
+            <p:style>
+              <a:lnRef idx="2">
+                <a:schemeClr val="dk1"/>
+              </a:lnRef>
+              <a:fillRef idx="1">
+                <a:schemeClr val="lt1"/>
+              </a:fillRef>
+              <a:effectRef idx="0">
+                <a:schemeClr val="dk1"/>
+              </a:effectRef>
+              <a:fontRef idx="minor">
+                <a:schemeClr val="dk1"/>
+              </a:fontRef>
+            </p:style>
+            <p:txBody>
+              <a:bodyPr rtlCol="0" anchor="ctr"/>
+              <a:lstStyle/>
+              <a:p>
+                <a:pPr algn="ctr"/>
+                <a:r>
+                  <a:rPr lang="zh-CN" altLang="en-US" sz="1200" dirty="0" smtClean="0">
+                    <a:latin typeface="宋体" panose="02010600030101010101" pitchFamily="2" charset="-122"/>
+                    <a:ea typeface="宋体" panose="02010600030101010101" pitchFamily="2" charset="-122"/>
+                  </a:rPr>
+                  <a:t>遍历团队完毕？</a:t>
+                </a:r>
+                <a:endParaRPr lang="zh-CN" altLang="en-US" sz="1200" dirty="0">
+                  <a:latin typeface="宋体" panose="02010600030101010101" pitchFamily="2" charset="-122"/>
+                  <a:ea typeface="宋体" panose="02010600030101010101" pitchFamily="2" charset="-122"/>
+                </a:endParaRPr>
+              </a:p>
+            </p:txBody>
+          </p:sp>
+          <p:sp>
+            <p:nvSpPr>
+              <p:cNvPr id="73" name="圆角矩形 72"/>
+              <p:cNvSpPr/>
+              <p:nvPr/>
+            </p:nvSpPr>
+            <p:spPr>
+              <a:xfrm>
+                <a:off x="3996640" y="9046680"/>
+                <a:ext cx="1160279" cy="362100"/>
+              </a:xfrm>
+              <a:prstGeom prst="roundRect">
+                <a:avLst/>
+              </a:prstGeom>
+            </p:spPr>
+            <p:style>
+              <a:lnRef idx="2">
+                <a:schemeClr val="dk1"/>
+              </a:lnRef>
+              <a:fillRef idx="1">
+                <a:schemeClr val="lt1"/>
+              </a:fillRef>
+              <a:effectRef idx="0">
+                <a:schemeClr val="dk1"/>
+              </a:effectRef>
+              <a:fontRef idx="minor">
+                <a:schemeClr val="dk1"/>
+              </a:fontRef>
+            </p:style>
+            <p:txBody>
+              <a:bodyPr rtlCol="0" anchor="ctr"/>
+              <a:lstStyle/>
+              <a:p>
+                <a:pPr algn="ctr"/>
+                <a:r>
+                  <a:rPr lang="zh-CN" altLang="en-US" sz="1200" dirty="0" smtClean="0">
+                    <a:latin typeface="宋体" panose="02010600030101010101" pitchFamily="2" charset="-122"/>
+                    <a:ea typeface="宋体" panose="02010600030101010101" pitchFamily="2" charset="-122"/>
+                  </a:rPr>
+                  <a:t>记录有关团队的统计信息</a:t>
+                </a:r>
+                <a:endParaRPr lang="zh-CN" altLang="en-US" sz="1200" dirty="0">
+                  <a:latin typeface="宋体" panose="02010600030101010101" pitchFamily="2" charset="-122"/>
+                  <a:ea typeface="宋体" panose="02010600030101010101" pitchFamily="2" charset="-122"/>
+                </a:endParaRPr>
+              </a:p>
+            </p:txBody>
+          </p:sp>
+          <p:cxnSp>
+            <p:nvCxnSpPr>
+              <p:cNvPr id="77" name="直接箭头连接符 76"/>
+              <p:cNvCxnSpPr>
+                <a:stCxn id="72" idx="2"/>
+                <a:endCxn id="73" idx="0"/>
+              </p:cNvCxnSpPr>
+              <p:nvPr/>
+            </p:nvCxnSpPr>
+            <p:spPr>
+              <a:xfrm>
+                <a:off x="4576780" y="8807849"/>
+                <a:ext cx="0" cy="238831"/>
+              </a:xfrm>
+              <a:prstGeom prst="straightConnector1">
+                <a:avLst/>
+              </a:prstGeom>
+              <a:ln w="12700">
+                <a:tailEnd type="triangle"/>
+              </a:ln>
+            </p:spPr>
+            <p:style>
+              <a:lnRef idx="1">
+                <a:schemeClr val="dk1"/>
+              </a:lnRef>
+              <a:fillRef idx="0">
+                <a:schemeClr val="dk1"/>
+              </a:fillRef>
+              <a:effectRef idx="0">
+                <a:schemeClr val="dk1"/>
+              </a:effectRef>
+              <a:fontRef idx="minor">
+                <a:schemeClr val="tx1"/>
+              </a:fontRef>
+            </p:style>
+          </p:cxnSp>
+          <p:sp>
+            <p:nvSpPr>
+              <p:cNvPr id="80" name="流程图: 决策 79"/>
+              <p:cNvSpPr/>
+              <p:nvPr/>
+            </p:nvSpPr>
+            <p:spPr>
+              <a:xfrm>
+                <a:off x="3932083" y="10160518"/>
+                <a:ext cx="1289394" cy="590267"/>
+              </a:xfrm>
+              <a:prstGeom prst="flowChartDecision">
+                <a:avLst/>
+              </a:prstGeom>
+            </p:spPr>
+            <p:style>
+              <a:lnRef idx="2">
+                <a:schemeClr val="dk1"/>
+              </a:lnRef>
+              <a:fillRef idx="1">
+                <a:schemeClr val="lt1"/>
+              </a:fillRef>
+              <a:effectRef idx="0">
+                <a:schemeClr val="dk1"/>
+              </a:effectRef>
+              <a:fontRef idx="minor">
+                <a:schemeClr val="dk1"/>
+              </a:fontRef>
+            </p:style>
+            <p:txBody>
+              <a:bodyPr rtlCol="0" anchor="ctr"/>
+              <a:lstStyle/>
+              <a:p>
+                <a:pPr algn="ctr"/>
+                <a:r>
+                  <a:rPr lang="zh-CN" altLang="en-US" sz="1200" dirty="0" smtClean="0">
+                    <a:latin typeface="宋体" panose="02010600030101010101" pitchFamily="2" charset="-122"/>
+                    <a:ea typeface="宋体" panose="02010600030101010101" pitchFamily="2" charset="-122"/>
+                  </a:rPr>
+                  <a:t>遍历项目完毕？</a:t>
+                </a:r>
+                <a:endParaRPr lang="zh-CN" altLang="en-US" sz="1200" dirty="0">
+                  <a:latin typeface="宋体" panose="02010600030101010101" pitchFamily="2" charset="-122"/>
+                  <a:ea typeface="宋体" panose="02010600030101010101" pitchFamily="2" charset="-122"/>
+                </a:endParaRPr>
+              </a:p>
+            </p:txBody>
+          </p:sp>
+          <p:cxnSp>
+            <p:nvCxnSpPr>
+              <p:cNvPr id="81" name="直接箭头连接符 80"/>
+              <p:cNvCxnSpPr>
+                <a:stCxn id="73" idx="2"/>
+                <a:endCxn id="110" idx="0"/>
+              </p:cNvCxnSpPr>
+              <p:nvPr/>
+            </p:nvCxnSpPr>
+            <p:spPr>
+              <a:xfrm flipH="1">
+                <a:off x="4576779" y="9408780"/>
+                <a:ext cx="1" cy="250191"/>
+              </a:xfrm>
+              <a:prstGeom prst="straightConnector1">
+                <a:avLst/>
+              </a:prstGeom>
+              <a:ln w="12700">
+                <a:tailEnd type="triangle"/>
+              </a:ln>
+            </p:spPr>
+            <p:style>
+              <a:lnRef idx="1">
+                <a:schemeClr val="dk1"/>
+              </a:lnRef>
+              <a:fillRef idx="0">
+                <a:schemeClr val="dk1"/>
+              </a:fillRef>
+              <a:effectRef idx="0">
+                <a:schemeClr val="dk1"/>
+              </a:effectRef>
+              <a:fontRef idx="minor">
+                <a:schemeClr val="tx1"/>
+              </a:fontRef>
+            </p:style>
+          </p:cxnSp>
+          <p:cxnSp>
+            <p:nvCxnSpPr>
+              <p:cNvPr id="87" name="肘形连接符 86"/>
+              <p:cNvCxnSpPr>
+                <a:stCxn id="80" idx="1"/>
+                <a:endCxn id="93" idx="1"/>
+              </p:cNvCxnSpPr>
+              <p:nvPr/>
+            </p:nvCxnSpPr>
+            <p:spPr>
+              <a:xfrm rot="10800000" flipH="1">
+                <a:off x="3932082" y="7847542"/>
+                <a:ext cx="79097" cy="2608110"/>
+              </a:xfrm>
+              <a:prstGeom prst="bentConnector3">
+                <a:avLst>
+                  <a:gd name="adj1" fmla="val -363942"/>
+                </a:avLst>
+              </a:prstGeom>
+              <a:ln w="12700">
+                <a:tailEnd type="triangle"/>
+              </a:ln>
+            </p:spPr>
+            <p:style>
+              <a:lnRef idx="1">
+                <a:schemeClr val="dk1"/>
+              </a:lnRef>
+              <a:fillRef idx="0">
+                <a:schemeClr val="dk1"/>
+              </a:fillRef>
+              <a:effectRef idx="0">
+                <a:schemeClr val="dk1"/>
+              </a:effectRef>
+              <a:fontRef idx="minor">
+                <a:schemeClr val="tx1"/>
+              </a:fontRef>
+            </p:style>
+          </p:cxnSp>
+          <p:sp>
+            <p:nvSpPr>
+              <p:cNvPr id="90" name="文本框 89"/>
+              <p:cNvSpPr txBox="1"/>
+              <p:nvPr/>
+            </p:nvSpPr>
+            <p:spPr>
+              <a:xfrm>
+                <a:off x="4533813" y="8755912"/>
+                <a:ext cx="372218" cy="276999"/>
+              </a:xfrm>
+              <a:prstGeom prst="rect">
+                <a:avLst/>
+              </a:prstGeom>
+              <a:noFill/>
+            </p:spPr>
+            <p:txBody>
+              <a:bodyPr wrap="none" rtlCol="0">
+                <a:spAutoFit/>
+              </a:bodyPr>
+              <a:lstStyle/>
+              <a:p>
+                <a:r>
+                  <a:rPr lang="en-US" altLang="zh-CN" sz="1200" dirty="0" smtClean="0">
+                    <a:latin typeface="Times New Roman" panose="02020603050405020304" pitchFamily="18" charset="0"/>
+                    <a:ea typeface="宋体" panose="02010600030101010101" pitchFamily="2" charset="-122"/>
+                    <a:cs typeface="Times New Roman" panose="02020603050405020304" pitchFamily="18" charset="0"/>
+                  </a:rPr>
+                  <a:t>No</a:t>
+                </a:r>
+                <a:endParaRPr lang="zh-CN" altLang="en-US" sz="1200" dirty="0">
+                  <a:latin typeface="Times New Roman" panose="02020603050405020304" pitchFamily="18" charset="0"/>
+                  <a:ea typeface="宋体" panose="02010600030101010101" pitchFamily="2" charset="-122"/>
+                  <a:cs typeface="Times New Roman" panose="02020603050405020304" pitchFamily="18" charset="0"/>
+                </a:endParaRPr>
+              </a:p>
+            </p:txBody>
+          </p:sp>
+          <p:sp>
+            <p:nvSpPr>
+              <p:cNvPr id="93" name="圆角矩形 92"/>
+              <p:cNvSpPr/>
+              <p:nvPr/>
+            </p:nvSpPr>
+            <p:spPr>
+              <a:xfrm>
+                <a:off x="4011180" y="7720542"/>
+                <a:ext cx="1131199" cy="254000"/>
+              </a:xfrm>
+              <a:prstGeom prst="roundRect">
+                <a:avLst/>
+              </a:prstGeom>
+            </p:spPr>
+            <p:style>
+              <a:lnRef idx="2">
+                <a:schemeClr val="dk1"/>
+              </a:lnRef>
+              <a:fillRef idx="1">
+                <a:schemeClr val="lt1"/>
+              </a:fillRef>
+              <a:effectRef idx="0">
+                <a:schemeClr val="dk1"/>
+              </a:effectRef>
+              <a:fontRef idx="minor">
+                <a:schemeClr val="dk1"/>
+              </a:fontRef>
+            </p:style>
+            <p:txBody>
+              <a:bodyPr rtlCol="0" anchor="ctr"/>
+              <a:lstStyle/>
+              <a:p>
+                <a:pPr algn="ctr"/>
+                <a:r>
+                  <a:rPr lang="zh-CN" altLang="en-US" sz="1200" dirty="0" smtClean="0">
+                    <a:latin typeface="宋体" panose="02010600030101010101" pitchFamily="2" charset="-122"/>
+                    <a:ea typeface="宋体" panose="02010600030101010101" pitchFamily="2" charset="-122"/>
+                  </a:rPr>
+                  <a:t>遍历团队链表</a:t>
+                </a:r>
+                <a:endParaRPr lang="zh-CN" altLang="en-US" sz="1200" dirty="0">
+                  <a:latin typeface="宋体" panose="02010600030101010101" pitchFamily="2" charset="-122"/>
+                  <a:ea typeface="宋体" panose="02010600030101010101" pitchFamily="2" charset="-122"/>
+                </a:endParaRPr>
+              </a:p>
+            </p:txBody>
+          </p:sp>
+          <p:cxnSp>
+            <p:nvCxnSpPr>
+              <p:cNvPr id="97" name="直接箭头连接符 96"/>
+              <p:cNvCxnSpPr>
+                <a:stCxn id="93" idx="2"/>
+                <a:endCxn id="72" idx="0"/>
+              </p:cNvCxnSpPr>
+              <p:nvPr/>
+            </p:nvCxnSpPr>
+            <p:spPr>
+              <a:xfrm>
+                <a:off x="4576780" y="7974542"/>
+                <a:ext cx="0" cy="243040"/>
+              </a:xfrm>
+              <a:prstGeom prst="straightConnector1">
+                <a:avLst/>
+              </a:prstGeom>
+              <a:ln w="12700">
+                <a:tailEnd type="triangle"/>
+              </a:ln>
+            </p:spPr>
+            <p:style>
+              <a:lnRef idx="1">
+                <a:schemeClr val="dk1"/>
+              </a:lnRef>
+              <a:fillRef idx="0">
+                <a:schemeClr val="dk1"/>
+              </a:fillRef>
+              <a:effectRef idx="0">
+                <a:schemeClr val="dk1"/>
+              </a:effectRef>
+              <a:fontRef idx="minor">
+                <a:schemeClr val="tx1"/>
+              </a:fontRef>
+            </p:style>
+          </p:cxnSp>
+          <p:sp>
+            <p:nvSpPr>
+              <p:cNvPr id="102" name="文本框 101"/>
+              <p:cNvSpPr txBox="1"/>
+              <p:nvPr/>
+            </p:nvSpPr>
+            <p:spPr>
+              <a:xfrm>
+                <a:off x="3637813" y="10187720"/>
+                <a:ext cx="408125" cy="276999"/>
+              </a:xfrm>
+              <a:prstGeom prst="rect">
+                <a:avLst/>
+              </a:prstGeom>
+              <a:noFill/>
+            </p:spPr>
+            <p:txBody>
+              <a:bodyPr wrap="none" rtlCol="0">
+                <a:spAutoFit/>
+              </a:bodyPr>
+              <a:lstStyle/>
+              <a:p>
+                <a:r>
+                  <a:rPr lang="en-US" altLang="zh-CN" sz="1200" dirty="0" smtClean="0">
+                    <a:latin typeface="Times New Roman" panose="02020603050405020304" pitchFamily="18" charset="0"/>
+                    <a:ea typeface="宋体" panose="02010600030101010101" pitchFamily="2" charset="-122"/>
+                    <a:cs typeface="Times New Roman" panose="02020603050405020304" pitchFamily="18" charset="0"/>
+                  </a:rPr>
+                  <a:t>Yes</a:t>
+                </a:r>
+                <a:endParaRPr lang="zh-CN" altLang="en-US" sz="1200" dirty="0">
+                  <a:latin typeface="Times New Roman" panose="02020603050405020304" pitchFamily="18" charset="0"/>
+                  <a:ea typeface="宋体" panose="02010600030101010101" pitchFamily="2" charset="-122"/>
+                  <a:cs typeface="Times New Roman" panose="02020603050405020304" pitchFamily="18" charset="0"/>
+                </a:endParaRPr>
+              </a:p>
+            </p:txBody>
+          </p:sp>
+          <p:sp>
+            <p:nvSpPr>
+              <p:cNvPr id="103" name="文本框 102"/>
+              <p:cNvSpPr txBox="1"/>
+              <p:nvPr/>
+            </p:nvSpPr>
+            <p:spPr>
+              <a:xfrm>
+                <a:off x="5142378" y="8273611"/>
+                <a:ext cx="408125" cy="276999"/>
+              </a:xfrm>
+              <a:prstGeom prst="rect">
+                <a:avLst/>
+              </a:prstGeom>
+              <a:noFill/>
+            </p:spPr>
+            <p:txBody>
+              <a:bodyPr wrap="none" rtlCol="0">
+                <a:spAutoFit/>
+              </a:bodyPr>
+              <a:lstStyle/>
+              <a:p>
+                <a:r>
+                  <a:rPr lang="en-US" altLang="zh-CN" sz="1200" dirty="0" smtClean="0">
+                    <a:latin typeface="Times New Roman" panose="02020603050405020304" pitchFamily="18" charset="0"/>
+                    <a:ea typeface="宋体" panose="02010600030101010101" pitchFamily="2" charset="-122"/>
+                    <a:cs typeface="Times New Roman" panose="02020603050405020304" pitchFamily="18" charset="0"/>
+                  </a:rPr>
+                  <a:t>Yes</a:t>
+                </a:r>
+                <a:endParaRPr lang="zh-CN" altLang="en-US" sz="1200" dirty="0">
+                  <a:latin typeface="Times New Roman" panose="02020603050405020304" pitchFamily="18" charset="0"/>
+                  <a:ea typeface="宋体" panose="02010600030101010101" pitchFamily="2" charset="-122"/>
+                  <a:cs typeface="Times New Roman" panose="02020603050405020304" pitchFamily="18" charset="0"/>
+                </a:endParaRPr>
+              </a:p>
+            </p:txBody>
+          </p:sp>
+          <p:sp>
+            <p:nvSpPr>
+              <p:cNvPr id="110" name="圆角矩形 109"/>
+              <p:cNvSpPr/>
+              <p:nvPr/>
+            </p:nvSpPr>
+            <p:spPr>
+              <a:xfrm>
+                <a:off x="4011179" y="9658971"/>
+                <a:ext cx="1131199" cy="254000"/>
+              </a:xfrm>
+              <a:prstGeom prst="roundRect">
+                <a:avLst/>
+              </a:prstGeom>
+            </p:spPr>
+            <p:style>
+              <a:lnRef idx="2">
+                <a:schemeClr val="dk1"/>
+              </a:lnRef>
+              <a:fillRef idx="1">
+                <a:schemeClr val="lt1"/>
+              </a:fillRef>
+              <a:effectRef idx="0">
+                <a:schemeClr val="dk1"/>
+              </a:effectRef>
+              <a:fontRef idx="minor">
+                <a:schemeClr val="dk1"/>
+              </a:fontRef>
+            </p:style>
+            <p:txBody>
+              <a:bodyPr rtlCol="0" anchor="ctr"/>
+              <a:lstStyle/>
+              <a:p>
+                <a:pPr algn="ctr"/>
+                <a:r>
+                  <a:rPr lang="zh-CN" altLang="en-US" sz="1200" dirty="0" smtClean="0">
+                    <a:latin typeface="宋体" panose="02010600030101010101" pitchFamily="2" charset="-122"/>
+                    <a:ea typeface="宋体" panose="02010600030101010101" pitchFamily="2" charset="-122"/>
+                  </a:rPr>
+                  <a:t>遍历项目链表</a:t>
+                </a:r>
+                <a:endParaRPr lang="zh-CN" altLang="en-US" sz="1200" dirty="0">
+                  <a:latin typeface="宋体" panose="02010600030101010101" pitchFamily="2" charset="-122"/>
+                  <a:ea typeface="宋体" panose="02010600030101010101" pitchFamily="2" charset="-122"/>
+                </a:endParaRPr>
+              </a:p>
+            </p:txBody>
+          </p:sp>
+          <p:cxnSp>
+            <p:nvCxnSpPr>
+              <p:cNvPr id="116" name="直接箭头连接符 115"/>
+              <p:cNvCxnSpPr>
+                <a:stCxn id="110" idx="2"/>
+                <a:endCxn id="80" idx="0"/>
+              </p:cNvCxnSpPr>
+              <p:nvPr/>
+            </p:nvCxnSpPr>
+            <p:spPr>
+              <a:xfrm>
+                <a:off x="4576779" y="9912971"/>
+                <a:ext cx="1" cy="247547"/>
+              </a:xfrm>
+              <a:prstGeom prst="straightConnector1">
+                <a:avLst/>
+              </a:prstGeom>
+              <a:ln w="12700">
+                <a:tailEnd type="triangle"/>
+              </a:ln>
+            </p:spPr>
+            <p:style>
+              <a:lnRef idx="1">
+                <a:schemeClr val="dk1"/>
+              </a:lnRef>
+              <a:fillRef idx="0">
+                <a:schemeClr val="dk1"/>
+              </a:fillRef>
+              <a:effectRef idx="0">
+                <a:schemeClr val="dk1"/>
+              </a:effectRef>
+              <a:fontRef idx="minor">
+                <a:schemeClr val="tx1"/>
+              </a:fontRef>
+            </p:style>
+          </p:cxnSp>
+          <p:cxnSp>
+            <p:nvCxnSpPr>
+              <p:cNvPr id="123" name="肘形连接符 122"/>
+              <p:cNvCxnSpPr>
+                <a:stCxn id="80" idx="2"/>
+                <a:endCxn id="110" idx="3"/>
+              </p:cNvCxnSpPr>
+              <p:nvPr/>
+            </p:nvCxnSpPr>
+            <p:spPr>
+              <a:xfrm rot="5400000" flipH="1" flipV="1">
+                <a:off x="4377172" y="9985579"/>
+                <a:ext cx="964814" cy="565598"/>
+              </a:xfrm>
+              <a:prstGeom prst="bentConnector4">
+                <a:avLst>
+                  <a:gd name="adj1" fmla="val -23694"/>
+                  <a:gd name="adj2" fmla="val 154402"/>
+                </a:avLst>
+              </a:prstGeom>
+              <a:ln w="12700">
+                <a:tailEnd type="triangle"/>
+              </a:ln>
+            </p:spPr>
+            <p:style>
+              <a:lnRef idx="1">
+                <a:schemeClr val="dk1"/>
+              </a:lnRef>
+              <a:fillRef idx="0">
+                <a:schemeClr val="dk1"/>
+              </a:fillRef>
+              <a:effectRef idx="0">
+                <a:schemeClr val="dk1"/>
+              </a:effectRef>
+              <a:fontRef idx="minor">
+                <a:schemeClr val="tx1"/>
+              </a:fontRef>
+            </p:style>
+          </p:cxnSp>
+          <p:sp>
+            <p:nvSpPr>
+              <p:cNvPr id="128" name="文本框 127"/>
+              <p:cNvSpPr txBox="1"/>
+              <p:nvPr/>
+            </p:nvSpPr>
+            <p:spPr>
+              <a:xfrm>
+                <a:off x="4536026" y="10692721"/>
+                <a:ext cx="372218" cy="276999"/>
+              </a:xfrm>
+              <a:prstGeom prst="rect">
+                <a:avLst/>
+              </a:prstGeom>
+              <a:noFill/>
+            </p:spPr>
+            <p:txBody>
+              <a:bodyPr wrap="none" rtlCol="0">
+                <a:spAutoFit/>
+              </a:bodyPr>
+              <a:lstStyle/>
+              <a:p>
+                <a:r>
+                  <a:rPr lang="en-US" altLang="zh-CN" sz="1200" dirty="0" smtClean="0">
+                    <a:latin typeface="Times New Roman" panose="02020603050405020304" pitchFamily="18" charset="0"/>
+                    <a:ea typeface="宋体" panose="02010600030101010101" pitchFamily="2" charset="-122"/>
+                    <a:cs typeface="Times New Roman" panose="02020603050405020304" pitchFamily="18" charset="0"/>
+                  </a:rPr>
+                  <a:t>No</a:t>
+                </a:r>
+                <a:endParaRPr lang="zh-CN" altLang="en-US" sz="1200" dirty="0">
+                  <a:latin typeface="Times New Roman" panose="02020603050405020304" pitchFamily="18" charset="0"/>
+                  <a:ea typeface="宋体" panose="02010600030101010101" pitchFamily="2" charset="-122"/>
+                  <a:cs typeface="Times New Roman" panose="02020603050405020304" pitchFamily="18" charset="0"/>
+                </a:endParaRPr>
+              </a:p>
+            </p:txBody>
+          </p:sp>
+          <p:sp>
+            <p:nvSpPr>
+              <p:cNvPr id="146" name="圆角矩形 145"/>
+              <p:cNvSpPr/>
+              <p:nvPr/>
+            </p:nvSpPr>
+            <p:spPr>
+              <a:xfrm>
+                <a:off x="3445846" y="7524897"/>
+                <a:ext cx="2208334" cy="3640849"/>
+              </a:xfrm>
+              <a:prstGeom prst="roundRect">
+                <a:avLst/>
+              </a:prstGeom>
+              <a:noFill/>
+              <a:ln>
+                <a:prstDash val="dash"/>
+              </a:ln>
+            </p:spPr>
+            <p:style>
+              <a:lnRef idx="2">
+                <a:schemeClr val="dk1"/>
+              </a:lnRef>
+              <a:fillRef idx="1">
+                <a:schemeClr val="lt1"/>
+              </a:fillRef>
+              <a:effectRef idx="0">
+                <a:schemeClr val="dk1"/>
+              </a:effectRef>
+              <a:fontRef idx="minor">
+                <a:schemeClr val="dk1"/>
+              </a:fontRef>
+            </p:style>
+            <p:txBody>
+              <a:bodyPr rtlCol="0" anchor="ctr"/>
+              <a:lstStyle/>
+              <a:p>
+                <a:pPr algn="ctr"/>
+                <a:endParaRPr lang="zh-CN" altLang="en-US" sz="1200" dirty="0">
+                  <a:latin typeface="宋体" panose="02010600030101010101" pitchFamily="2" charset="-122"/>
+                  <a:ea typeface="宋体" panose="02010600030101010101" pitchFamily="2" charset="-122"/>
+                </a:endParaRPr>
+              </a:p>
+            </p:txBody>
+          </p:sp>
+          <p:cxnSp>
+            <p:nvCxnSpPr>
+              <p:cNvPr id="149" name="直接连接符 148"/>
+              <p:cNvCxnSpPr>
+                <a:stCxn id="72" idx="3"/>
+              </p:cNvCxnSpPr>
+              <p:nvPr/>
+            </p:nvCxnSpPr>
+            <p:spPr>
+              <a:xfrm>
+                <a:off x="5221477" y="8512716"/>
+                <a:ext cx="591154" cy="253"/>
+              </a:xfrm>
+              <a:prstGeom prst="line">
+                <a:avLst/>
+              </a:prstGeom>
+              <a:ln w="12700">
+                <a:tailEnd type="oval"/>
+              </a:ln>
+            </p:spPr>
+            <p:style>
+              <a:lnRef idx="1">
+                <a:schemeClr val="dk1"/>
+              </a:lnRef>
+              <a:fillRef idx="0">
+                <a:schemeClr val="dk1"/>
+              </a:fillRef>
+              <a:effectRef idx="0">
+                <a:schemeClr val="dk1"/>
+              </a:effectRef>
+              <a:fontRef idx="minor">
+                <a:schemeClr val="tx1"/>
+              </a:fontRef>
+            </p:style>
+          </p:cxnSp>
+        </p:grpSp>
+        <p:sp>
+          <p:nvSpPr>
+            <p:cNvPr id="158" name="文本框 157"/>
+            <p:cNvSpPr txBox="1"/>
+            <p:nvPr/>
+          </p:nvSpPr>
+          <p:spPr>
+            <a:xfrm>
+              <a:off x="4135433" y="2470617"/>
+              <a:ext cx="1723549" cy="246221"/>
+            </a:xfrm>
+            <a:prstGeom prst="rect">
+              <a:avLst/>
+            </a:prstGeom>
+            <a:noFill/>
+          </p:spPr>
+          <p:txBody>
+            <a:bodyPr wrap="none" rtlCol="0">
+              <a:spAutoFit/>
+            </a:bodyPr>
+            <a:lstStyle/>
+            <a:p>
+              <a:r>
+                <a:rPr lang="zh-CN" altLang="en-US" sz="1000" dirty="0" smtClean="0">
+                  <a:latin typeface="黑体" panose="02010609060101010101" pitchFamily="49" charset="-122"/>
+                  <a:ea typeface="黑体" panose="02010609060101010101" pitchFamily="49" charset="-122"/>
+                </a:rPr>
+                <a:t>向节点中写入统计信息过程</a:t>
+              </a:r>
+              <a:endParaRPr lang="zh-CN" altLang="en-US" sz="1000" dirty="0">
+                <a:latin typeface="黑体" panose="02010609060101010101" pitchFamily="49" charset="-122"/>
+                <a:ea typeface="黑体" panose="02010609060101010101" pitchFamily="49" charset="-122"/>
+              </a:endParaRPr>
+            </a:p>
+          </p:txBody>
+        </p:sp>
+      </p:grpSp>
+    </p:spTree>
+    <p:extLst>
+      <p:ext uri="{BB962C8B-B14F-4D97-AF65-F5344CB8AC3E}">
+        <p14:creationId xmlns:p14="http://schemas.microsoft.com/office/powerpoint/2010/main" val="1503375966"/>
+      </p:ext>
+    </p:extLst>
+  </p:cSld>
+  <p:clrMapOvr>
+    <a:masterClrMapping/>
+  </p:clrMapOvr>
+  <p:timing>
+    <p:tnLst>
+      <p:par>
+        <p:cTn id="1" dur="indefinite" restart="never" nodeType="tmRoot"/>
+      </p:par>
+    </p:tnLst>
+  </p:timing>
+</p:sld>
+</file>
+
 <file path=ppt/slides/slide2.xml><?xml version="1.0" encoding="utf-8"?>
 <p:sld xmlns:a="http://schemas.openxmlformats.org/drawingml/2006/main" xmlns:r="http://schemas.openxmlformats.org/officeDocument/2006/relationships" xmlns:p="http://schemas.openxmlformats.org/presentationml/2006/main">
   <p:cSld>
@@ -16043,6 +19039,13 @@
   <p:clrMapOvr>
     <a:masterClrMapping/>
   </p:clrMapOvr>
+  <p:timing>
+    <p:tnLst>
+      <p:par>
+        <p:cTn id="1" dur="indefinite" restart="never" nodeType="tmRoot"/>
+      </p:par>
+    </p:tnLst>
+  </p:timing>
 </p:sld>
 </file>
 
@@ -18739,6 +21742,13 @@
   <p:clrMapOvr>
     <a:masterClrMapping/>
   </p:clrMapOvr>
+  <p:timing>
+    <p:tnLst>
+      <p:par>
+        <p:cTn id="1" dur="indefinite" restart="never" nodeType="tmRoot"/>
+      </p:par>
+    </p:tnLst>
+  </p:timing>
 </p:sld>
 </file>
 

</xml_diff>